<commit_message>
Changed slides resolution + few more slides
</commit_message>
<xml_diff>
--- a/GamePhysics.pptx
+++ b/GamePhysics.pptx
@@ -14,33 +14,36 @@
     <p:sldId id="267" r:id="rId8"/>
     <p:sldId id="268" r:id="rId9"/>
     <p:sldId id="269" r:id="rId10"/>
-    <p:sldId id="261" r:id="rId11"/>
-    <p:sldId id="270" r:id="rId12"/>
-    <p:sldId id="273" r:id="rId13"/>
-    <p:sldId id="274" r:id="rId14"/>
-    <p:sldId id="272" r:id="rId15"/>
-    <p:sldId id="275" r:id="rId16"/>
-    <p:sldId id="262" r:id="rId17"/>
-    <p:sldId id="276" r:id="rId18"/>
-    <p:sldId id="277" r:id="rId19"/>
-    <p:sldId id="264" r:id="rId20"/>
-    <p:sldId id="278" r:id="rId21"/>
-    <p:sldId id="279" r:id="rId22"/>
-    <p:sldId id="263" r:id="rId23"/>
-    <p:sldId id="280" r:id="rId24"/>
-    <p:sldId id="281" r:id="rId25"/>
-    <p:sldId id="282" r:id="rId26"/>
-    <p:sldId id="265" r:id="rId27"/>
-    <p:sldId id="283" r:id="rId28"/>
-    <p:sldId id="284" r:id="rId29"/>
-    <p:sldId id="289" r:id="rId30"/>
-    <p:sldId id="287" r:id="rId31"/>
-    <p:sldId id="290" r:id="rId32"/>
-    <p:sldId id="288" r:id="rId33"/>
-    <p:sldId id="291" r:id="rId34"/>
-    <p:sldId id="286" r:id="rId35"/>
+    <p:sldId id="292" r:id="rId11"/>
+    <p:sldId id="261" r:id="rId12"/>
+    <p:sldId id="270" r:id="rId13"/>
+    <p:sldId id="273" r:id="rId14"/>
+    <p:sldId id="274" r:id="rId15"/>
+    <p:sldId id="272" r:id="rId16"/>
+    <p:sldId id="275" r:id="rId17"/>
+    <p:sldId id="262" r:id="rId18"/>
+    <p:sldId id="276" r:id="rId19"/>
+    <p:sldId id="277" r:id="rId20"/>
+    <p:sldId id="264" r:id="rId21"/>
+    <p:sldId id="278" r:id="rId22"/>
+    <p:sldId id="279" r:id="rId23"/>
+    <p:sldId id="263" r:id="rId24"/>
+    <p:sldId id="280" r:id="rId25"/>
+    <p:sldId id="281" r:id="rId26"/>
+    <p:sldId id="282" r:id="rId27"/>
+    <p:sldId id="265" r:id="rId28"/>
+    <p:sldId id="283" r:id="rId29"/>
+    <p:sldId id="284" r:id="rId30"/>
+    <p:sldId id="289" r:id="rId31"/>
+    <p:sldId id="287" r:id="rId32"/>
+    <p:sldId id="290" r:id="rId33"/>
+    <p:sldId id="293" r:id="rId34"/>
+    <p:sldId id="294" r:id="rId35"/>
+    <p:sldId id="288" r:id="rId36"/>
+    <p:sldId id="291" r:id="rId37"/>
+    <p:sldId id="286" r:id="rId38"/>
   </p:sldIdLst>
-  <p:sldSz cx="9144000" cy="5143500" type="screen16x9"/>
+  <p:sldSz cx="9144000" cy="6858000" type="screen4x3"/>
   <p:notesSz cx="6858000" cy="9144000"/>
   <p:defaultTextStyle>
     <a:defPPr>
@@ -169,8 +172,8 @@
         </p:nvSpPr>
         <p:spPr>
           <a:xfrm>
-            <a:off x="457200" y="171450"/>
-            <a:ext cx="7772400" cy="3428999"/>
+            <a:off x="457200" y="228601"/>
+            <a:ext cx="7772400" cy="4571999"/>
           </a:xfrm>
         </p:spPr>
         <p:txBody>
@@ -210,8 +213,8 @@
         </p:nvSpPr>
         <p:spPr>
           <a:xfrm>
-            <a:off x="457200" y="3600450"/>
-            <a:ext cx="6858000" cy="685800"/>
+            <a:off x="457200" y="4800600"/>
+            <a:ext cx="6858000" cy="914400"/>
           </a:xfrm>
         </p:spPr>
         <p:txBody>
@@ -334,7 +337,7 @@
             <a:fld id="{451DEABC-D766-4322-8E78-B830FAE35C72}" type="datetime4">
               <a:rPr lang="en-US" smtClean="0"/>
               <a:pPr/>
-              <a:t>May 7, 2014</a:t>
+              <a:t>May 19, 2014</a:t>
             </a:fld>
             <a:endParaRPr lang="en-US" dirty="0"/>
           </a:p>
@@ -367,8 +370,8 @@
         </p:nvSpPr>
         <p:spPr>
           <a:xfrm>
-            <a:off x="9001124" y="3634740"/>
-            <a:ext cx="142876" cy="1508760"/>
+            <a:off x="9001124" y="4846320"/>
+            <a:ext cx="142876" cy="2011680"/>
           </a:xfrm>
           <a:prstGeom prst="rect">
             <a:avLst/>
@@ -414,7 +417,7 @@
         <p:spPr>
           <a:xfrm>
             <a:off x="9001124" y="0"/>
-            <a:ext cx="142876" cy="3634740"/>
+            <a:ext cx="142876" cy="4846320"/>
           </a:xfrm>
           <a:prstGeom prst="rect">
             <a:avLst/>
@@ -601,7 +604,7 @@
             <a:fld id="{F3131F9E-604E-4343-9F29-EF72E8231CAD}" type="datetime4">
               <a:rPr lang="en-US" smtClean="0"/>
               <a:pPr/>
-              <a:t>May 7, 2014</a:t>
+              <a:t>May 19, 2014</a:t>
             </a:fld>
             <a:endParaRPr lang="en-US"/>
           </a:p>
@@ -687,8 +690,8 @@
         </p:nvSpPr>
         <p:spPr>
           <a:xfrm>
-            <a:off x="6629400" y="205979"/>
-            <a:ext cx="2057400" cy="4388644"/>
+            <a:off x="6629400" y="274639"/>
+            <a:ext cx="2057400" cy="5851525"/>
           </a:xfrm>
         </p:spPr>
         <p:txBody>
@@ -715,8 +718,8 @@
         </p:nvSpPr>
         <p:spPr>
           <a:xfrm>
-            <a:off x="457200" y="205979"/>
-            <a:ext cx="6019800" cy="4388644"/>
+            <a:off x="457200" y="274639"/>
+            <a:ext cx="6019800" cy="5851525"/>
           </a:xfrm>
         </p:spPr>
         <p:txBody>
@@ -778,7 +781,7 @@
             <a:fld id="{34A8E1CE-37F8-4102-8DF9-852A0A51F293}" type="datetime4">
               <a:rPr lang="en-US" smtClean="0"/>
               <a:pPr/>
-              <a:t>May 7, 2014</a:t>
+              <a:t>May 19, 2014</a:t>
             </a:fld>
             <a:endParaRPr lang="en-US"/>
           </a:p>
@@ -945,7 +948,7 @@
             <a:fld id="{93333F43-3E86-47E4-BFBB-2476D384E1C6}" type="datetime4">
               <a:rPr lang="en-US" smtClean="0"/>
               <a:pPr/>
-              <a:t>May 7, 2014</a:t>
+              <a:t>May 19, 2014</a:t>
             </a:fld>
             <a:endParaRPr lang="en-US"/>
           </a:p>
@@ -1031,8 +1034,8 @@
         </p:nvSpPr>
         <p:spPr>
           <a:xfrm>
-            <a:off x="457200" y="1085851"/>
-            <a:ext cx="7772400" cy="3240881"/>
+            <a:off x="457200" y="1447802"/>
+            <a:ext cx="7772400" cy="4321175"/>
           </a:xfrm>
         </p:spPr>
         <p:txBody>
@@ -1072,8 +1075,8 @@
         </p:nvSpPr>
         <p:spPr>
           <a:xfrm>
-            <a:off x="457200" y="171451"/>
-            <a:ext cx="7772400" cy="800100"/>
+            <a:off x="457200" y="228601"/>
+            <a:ext cx="7772400" cy="1066800"/>
           </a:xfrm>
         </p:spPr>
         <p:txBody>
@@ -1196,7 +1199,7 @@
             <a:fld id="{751663BA-01FC-4367-B6F3-ABB2645D55F1}" type="datetime4">
               <a:rPr lang="en-US" smtClean="0"/>
               <a:pPr/>
-              <a:t>May 7, 2014</a:t>
+              <a:t>May 19, 2014</a:t>
             </a:fld>
             <a:endParaRPr lang="en-US" dirty="0"/>
           </a:p>
@@ -1305,8 +1308,8 @@
         </p:nvSpPr>
         <p:spPr>
           <a:xfrm>
-            <a:off x="1630680" y="1181101"/>
-            <a:ext cx="3291840" cy="3394472"/>
+            <a:off x="1630680" y="1574801"/>
+            <a:ext cx="3291840" cy="4525963"/>
           </a:xfrm>
         </p:spPr>
         <p:txBody>
@@ -1390,8 +1393,8 @@
         </p:nvSpPr>
         <p:spPr>
           <a:xfrm>
-            <a:off x="5090160" y="1181101"/>
-            <a:ext cx="3291840" cy="3394472"/>
+            <a:off x="5090160" y="1574801"/>
+            <a:ext cx="3291840" cy="4525963"/>
           </a:xfrm>
         </p:spPr>
         <p:txBody>
@@ -1481,7 +1484,7 @@
             <a:fld id="{79B19C71-EC74-44AF-B27E-FC7DC3C3A61D}" type="datetime4">
               <a:rPr lang="en-US" smtClean="0"/>
               <a:pPr/>
-              <a:t>May 7, 2014</a:t>
+              <a:t>May 19, 2014</a:t>
             </a:fld>
             <a:endParaRPr lang="en-US"/>
           </a:p>
@@ -1594,8 +1597,8 @@
         </p:nvSpPr>
         <p:spPr>
           <a:xfrm>
-            <a:off x="1627632" y="1179576"/>
-            <a:ext cx="3291840" cy="479822"/>
+            <a:off x="1627632" y="1572768"/>
+            <a:ext cx="3291840" cy="639763"/>
           </a:xfrm>
         </p:spPr>
         <p:txBody>
@@ -1666,8 +1669,8 @@
         </p:nvSpPr>
         <p:spPr>
           <a:xfrm>
-            <a:off x="1627632" y="1694525"/>
-            <a:ext cx="3291840" cy="2880360"/>
+            <a:off x="1627632" y="2259367"/>
+            <a:ext cx="3291840" cy="3840480"/>
           </a:xfrm>
         </p:spPr>
         <p:txBody>
@@ -1751,8 +1754,8 @@
         </p:nvSpPr>
         <p:spPr>
           <a:xfrm>
-            <a:off x="5093208" y="1179576"/>
-            <a:ext cx="3291840" cy="479822"/>
+            <a:off x="5093208" y="1572768"/>
+            <a:ext cx="3291840" cy="639763"/>
           </a:xfrm>
         </p:spPr>
         <p:txBody>
@@ -1831,8 +1834,8 @@
         </p:nvSpPr>
         <p:spPr>
           <a:xfrm>
-            <a:off x="5093208" y="1694525"/>
-            <a:ext cx="3291840" cy="2880360"/>
+            <a:off x="5093208" y="2259367"/>
+            <a:ext cx="3291840" cy="3840480"/>
           </a:xfrm>
         </p:spPr>
         <p:txBody>
@@ -1922,7 +1925,7 @@
             <a:fld id="{6A5CDA29-3CBE-48EA-92AE-A996835462BA}" type="datetime4">
               <a:rPr lang="en-US" smtClean="0"/>
               <a:pPr/>
-              <a:t>May 7, 2014</a:t>
+              <a:t>May 19, 2014</a:t>
             </a:fld>
             <a:endParaRPr lang="en-US"/>
           </a:p>
@@ -2037,7 +2040,7 @@
             <a:fld id="{E29EC054-3869-4501-B163-1BBFDE8DCE04}" type="datetime4">
               <a:rPr lang="en-US" smtClean="0"/>
               <a:pPr/>
-              <a:t>May 7, 2014</a:t>
+              <a:t>May 19, 2014</a:t>
             </a:fld>
             <a:endParaRPr lang="en-US"/>
           </a:p>
@@ -2129,7 +2132,7 @@
             <a:fld id="{0A63D831-56C1-49CF-8EF7-8B9A98402BCD}" type="datetime4">
               <a:rPr lang="en-US" smtClean="0"/>
               <a:pPr/>
-              <a:t>May 7, 2014</a:t>
+              <a:t>May 19, 2014</a:t>
             </a:fld>
             <a:endParaRPr lang="en-US"/>
           </a:p>
@@ -2215,8 +2218,8 @@
         </p:nvSpPr>
         <p:spPr>
           <a:xfrm>
-            <a:off x="3575050" y="1200150"/>
-            <a:ext cx="5111750" cy="3360420"/>
+            <a:off x="3575050" y="1600200"/>
+            <a:ext cx="5111750" cy="4480560"/>
           </a:xfrm>
         </p:spPr>
         <p:txBody>
@@ -2300,8 +2303,8 @@
         </p:nvSpPr>
         <p:spPr>
           <a:xfrm>
-            <a:off x="457201" y="1200150"/>
-            <a:ext cx="3008313" cy="3360420"/>
+            <a:off x="457202" y="1600200"/>
+            <a:ext cx="3008313" cy="4480560"/>
           </a:xfrm>
         </p:spPr>
         <p:txBody>
@@ -2373,7 +2376,7 @@
             <a:fld id="{6EAD5615-7F4F-4584-84D5-CC95918C321F}" type="datetime4">
               <a:rPr lang="en-US" smtClean="0"/>
               <a:pPr/>
-              <a:t>May 7, 2014</a:t>
+              <a:t>May 19, 2014</a:t>
             </a:fld>
             <a:endParaRPr lang="en-US"/>
           </a:p>
@@ -2478,8 +2481,8 @@
         </p:nvSpPr>
         <p:spPr>
           <a:xfrm>
-            <a:off x="9001124" y="3634740"/>
-            <a:ext cx="142876" cy="1508760"/>
+            <a:off x="9001124" y="4846320"/>
+            <a:ext cx="142876" cy="2011680"/>
           </a:xfrm>
           <a:prstGeom prst="rect">
             <a:avLst/>
@@ -2529,7 +2532,7 @@
         <p:spPr>
           <a:xfrm>
             <a:off x="-1" y="0"/>
-            <a:ext cx="9000877" cy="3634740"/>
+            <a:ext cx="9000877" cy="4846320"/>
           </a:xfrm>
           <a:solidFill>
             <a:schemeClr val="bg1">
@@ -2598,8 +2601,8 @@
         </p:nvSpPr>
         <p:spPr>
           <a:xfrm>
-            <a:off x="457200" y="4286250"/>
-            <a:ext cx="8153400" cy="342900"/>
+            <a:off x="457200" y="5715000"/>
+            <a:ext cx="8153400" cy="457200"/>
           </a:xfrm>
         </p:spPr>
         <p:txBody>
@@ -2669,7 +2672,7 @@
             <a:fld id="{76EEA923-9BEE-48CE-9F28-5B525F399BAD}" type="datetime4">
               <a:rPr lang="en-US" smtClean="0"/>
               <a:pPr/>
-              <a:t>May 7, 2014</a:t>
+              <a:t>May 19, 2014</a:t>
             </a:fld>
             <a:endParaRPr lang="en-US"/>
           </a:p>
@@ -2738,8 +2741,8 @@
         </p:nvSpPr>
         <p:spPr>
           <a:xfrm>
-            <a:off x="457200" y="3714750"/>
-            <a:ext cx="8153400" cy="571500"/>
+            <a:off x="457200" y="4953000"/>
+            <a:ext cx="8153400" cy="762000"/>
           </a:xfrm>
         </p:spPr>
         <p:txBody>
@@ -2769,7 +2772,7 @@
         <p:spPr>
           <a:xfrm>
             <a:off x="9001124" y="0"/>
-            <a:ext cx="142876" cy="3634740"/>
+            <a:ext cx="142876" cy="4846320"/>
           </a:xfrm>
           <a:prstGeom prst="rect">
             <a:avLst/>
@@ -2848,8 +2851,8 @@
         </p:nvSpPr>
         <p:spPr>
           <a:xfrm>
-            <a:off x="457200" y="114539"/>
-            <a:ext cx="5791200" cy="1028700"/>
+            <a:off x="457200" y="152719"/>
+            <a:ext cx="5791200" cy="1371600"/>
           </a:xfrm>
           <a:prstGeom prst="rect">
             <a:avLst/>
@@ -2881,8 +2884,8 @@
         </p:nvSpPr>
         <p:spPr>
           <a:xfrm>
-            <a:off x="457200" y="1314451"/>
-            <a:ext cx="7620000" cy="3280172"/>
+            <a:off x="457200" y="1752601"/>
+            <a:ext cx="7620000" cy="4373563"/>
           </a:xfrm>
           <a:prstGeom prst="rect">
             <a:avLst/>
@@ -2943,8 +2946,8 @@
         </p:nvSpPr>
         <p:spPr>
           <a:xfrm>
-            <a:off x="457200" y="4629151"/>
-            <a:ext cx="3429000" cy="228600"/>
+            <a:off x="457200" y="6172201"/>
+            <a:ext cx="3429000" cy="304800"/>
           </a:xfrm>
           <a:prstGeom prst="rect">
             <a:avLst/>
@@ -2965,7 +2968,7 @@
             <a:fld id="{17D0EFEE-2756-4A20-BF2A-63F0A94F99AC}" type="datetime4">
               <a:rPr lang="en-US" smtClean="0"/>
               <a:pPr/>
-              <a:t>May 7, 2014</a:t>
+              <a:t>May 19, 2014</a:t>
             </a:fld>
             <a:endParaRPr lang="en-US" dirty="0"/>
           </a:p>
@@ -2983,8 +2986,8 @@
         </p:nvSpPr>
         <p:spPr>
           <a:xfrm>
-            <a:off x="457200" y="4869657"/>
-            <a:ext cx="3429000" cy="212884"/>
+            <a:off x="457200" y="6492876"/>
+            <a:ext cx="3429000" cy="283845"/>
           </a:xfrm>
           <a:prstGeom prst="rect">
             <a:avLst/>
@@ -3018,8 +3021,8 @@
         </p:nvSpPr>
         <p:spPr>
           <a:xfrm rot="16200000">
-            <a:off x="8391843" y="4368483"/>
-            <a:ext cx="986791" cy="365125"/>
+            <a:off x="8227379" y="5885499"/>
+            <a:ext cx="1315721" cy="365125"/>
           </a:xfrm>
           <a:prstGeom prst="rect">
             <a:avLst/>
@@ -3055,7 +3058,7 @@
         <p:spPr>
           <a:xfrm>
             <a:off x="9001124" y="0"/>
-            <a:ext cx="142876" cy="1028700"/>
+            <a:ext cx="142876" cy="1371600"/>
           </a:xfrm>
           <a:prstGeom prst="rect">
             <a:avLst/>
@@ -3100,8 +3103,8 @@
         </p:nvSpPr>
         <p:spPr>
           <a:xfrm>
-            <a:off x="9001124" y="1028700"/>
-            <a:ext cx="142876" cy="4114800"/>
+            <a:off x="9001124" y="1371600"/>
+            <a:ext cx="142876" cy="5486400"/>
           </a:xfrm>
           <a:prstGeom prst="rect">
             <a:avLst/>
@@ -3464,8 +3467,8 @@
         </p:nvSpPr>
         <p:spPr>
           <a:xfrm>
-            <a:off x="457200" y="171450"/>
-            <a:ext cx="7772400" cy="3963670"/>
+            <a:off x="457200" y="228600"/>
+            <a:ext cx="7772400" cy="5284893"/>
           </a:xfrm>
         </p:spPr>
         <p:txBody>
@@ -3557,20 +3560,91 @@
         </p:nvSpPr>
         <p:spPr>
           <a:xfrm>
-            <a:off x="91440" y="114539"/>
-            <a:ext cx="3931920" cy="586501"/>
+            <a:off x="457200" y="392941"/>
+            <a:ext cx="8352387" cy="754251"/>
           </a:xfrm>
         </p:spPr>
         <p:txBody>
           <a:bodyPr>
-            <a:normAutofit fontScale="90000"/>
+            <a:normAutofit/>
           </a:bodyPr>
           <a:lstStyle/>
           <a:p>
-            <a:r>
-              <a:rPr lang="ru-RU" dirty="0" smtClean="0"/>
+            <a:pPr algn="ctr"/>
+            <a:r>
+              <a:rPr lang="ru-RU" sz="4000" dirty="0" smtClean="0"/>
+              <a:t>Силы и взаимодействие</a:t>
+            </a:r>
+            <a:endParaRPr lang="en-US" sz="4000" dirty="0"/>
+          </a:p>
+        </p:txBody>
+      </p:sp>
+      <p:sp>
+        <p:nvSpPr>
+          <p:cNvPr id="3" name="Content Placeholder 2"/>
+          <p:cNvSpPr>
+            <a:spLocks noGrp="1"/>
+          </p:cNvSpPr>
+          <p:nvPr>
+            <p:ph idx="1"/>
+          </p:nvPr>
+        </p:nvSpPr>
+        <p:spPr/>
+        <p:txBody>
+          <a:bodyPr/>
+          <a:lstStyle/>
+          <a:p>
+            <a:pPr marL="342900" indent="-342900">
+              <a:buFont typeface="Arial"/>
+              <a:buChar char="•"/>
+            </a:pPr>
+            <a:r>
+              <a:rPr lang="ru-RU" sz="3200" dirty="0" smtClean="0"/>
               <a:t>Гравитация</a:t>
             </a:r>
+          </a:p>
+          <a:p>
+            <a:pPr marL="342900" indent="-342900">
+              <a:buFont typeface="Arial"/>
+              <a:buChar char="•"/>
+            </a:pPr>
+            <a:r>
+              <a:rPr lang="ru-RU" sz="3200" dirty="0" smtClean="0"/>
+              <a:t>Импульс</a:t>
+            </a:r>
+          </a:p>
+          <a:p>
+            <a:pPr marL="342900" indent="-342900">
+              <a:buFont typeface="Arial"/>
+              <a:buChar char="•"/>
+            </a:pPr>
+            <a:r>
+              <a:rPr lang="ru-RU" sz="3200" dirty="0" smtClean="0"/>
+              <a:t>Столкновение</a:t>
+            </a:r>
+          </a:p>
+          <a:p>
+            <a:pPr marL="342900" indent="-342900">
+              <a:buFont typeface="Arial"/>
+              <a:buChar char="•"/>
+            </a:pPr>
+            <a:r>
+              <a:rPr lang="ru-RU" sz="3200" dirty="0" smtClean="0"/>
+              <a:t>Трение</a:t>
+            </a:r>
+          </a:p>
+          <a:p>
+            <a:pPr marL="342900" indent="-342900">
+              <a:buFont typeface="Arial"/>
+              <a:buChar char="•"/>
+            </a:pPr>
+            <a:r>
+              <a:rPr lang="ru-RU" sz="3200" dirty="0" smtClean="0"/>
+              <a:t>Упругость</a:t>
+            </a:r>
+            <a:endParaRPr lang="ru-RU" dirty="0" smtClean="0"/>
+          </a:p>
+          <a:p>
             <a:endParaRPr lang="en-US" dirty="0"/>
           </a:p>
         </p:txBody>
@@ -3583,16 +3657,40 @@
           </p:cNvPicPr>
           <p:nvPr/>
         </p:nvPicPr>
+        <p:blipFill rotWithShape="1">
+          <a:blip r:embed="rId2"/>
+          <a:srcRect l="-30" t="-1258" r="2546" b="1258"/>
+          <a:stretch/>
+        </p:blipFill>
+        <p:spPr>
+          <a:xfrm>
+            <a:off x="5765899" y="1147192"/>
+            <a:ext cx="3043688" cy="3062855"/>
+          </a:xfrm>
+          <a:prstGeom prst="rect">
+            <a:avLst/>
+          </a:prstGeom>
+        </p:spPr>
+      </p:pic>
+      <p:pic>
+        <p:nvPicPr>
+          <p:cNvPr id="6" name="Content Placeholder 3"/>
+          <p:cNvPicPr>
+            <a:picLocks noChangeAspect="1"/>
+          </p:cNvPicPr>
+          <p:nvPr/>
+        </p:nvPicPr>
         <p:blipFill>
-          <a:blip r:embed="rId2"/>
+          <a:blip r:embed="rId3"/>
+          <a:srcRect t="-8534" b="-8534"/>
           <a:stretch>
             <a:fillRect/>
           </a:stretch>
         </p:blipFill>
         <p:spPr>
           <a:xfrm>
-            <a:off x="3637280" y="50443"/>
-            <a:ext cx="5191760" cy="5093057"/>
+            <a:off x="3823793" y="4114221"/>
+            <a:ext cx="5172653" cy="2968887"/>
           </a:xfrm>
           <a:prstGeom prst="rect">
             <a:avLst/>
@@ -3602,7 +3700,7 @@
     </p:spTree>
     <p:extLst>
       <p:ext uri="{BB962C8B-B14F-4D97-AF65-F5344CB8AC3E}">
-        <p14:creationId xmlns:p14="http://schemas.microsoft.com/office/powerpoint/2010/main" val="3508750416"/>
+        <p14:creationId xmlns:p14="http://schemas.microsoft.com/office/powerpoint/2010/main" val="2819690802"/>
       </p:ext>
     </p:extLst>
   </p:cSld>
@@ -3629,128 +3727,63 @@
           <a:chExt cx="0" cy="0"/>
         </a:xfrm>
       </p:grpSpPr>
-      <p:sp>
-        <p:nvSpPr>
-          <p:cNvPr id="2" name="Title 1"/>
-          <p:cNvSpPr>
-            <a:spLocks noGrp="1"/>
-          </p:cNvSpPr>
-          <p:nvPr>
-            <p:ph type="title"/>
-          </p:nvPr>
-        </p:nvSpPr>
-        <p:spPr/>
-        <p:txBody>
-          <a:bodyPr>
-            <a:normAutofit fontScale="90000"/>
-          </a:bodyPr>
-          <a:lstStyle/>
-          <a:p>
-            <a:r>
-              <a:rPr lang="ru-RU" dirty="0" smtClean="0"/>
-              <a:t>ГРАВИТАЦИЯ В</a:t>
-            </a:r>
-            <a:r>
-              <a:rPr lang="en-US" dirty="0" smtClean="0"/>
-              <a:t/>
-            </a:r>
-            <a:br>
-              <a:rPr lang="en-US" dirty="0" smtClean="0"/>
-            </a:br>
-            <a:r>
-              <a:rPr lang="en-US" dirty="0" smtClean="0"/>
-              <a:t>P2.js </a:t>
-            </a:r>
-            <a:r>
-              <a:rPr lang="ru-RU" dirty="0" smtClean="0"/>
-              <a:t>И</a:t>
-            </a:r>
-            <a:r>
-              <a:rPr lang="en-US" dirty="0" smtClean="0"/>
-              <a:t> </a:t>
-            </a:r>
-            <a:r>
-              <a:rPr lang="en-US" dirty="0" err="1" smtClean="0"/>
-              <a:t>physics.js</a:t>
-            </a:r>
-            <a:endParaRPr lang="en-US" dirty="0"/>
-          </a:p>
-        </p:txBody>
-      </p:sp>
-      <p:sp>
-        <p:nvSpPr>
-          <p:cNvPr id="3" name="Content Placeholder 2"/>
-          <p:cNvSpPr>
-            <a:spLocks noGrp="1"/>
-          </p:cNvSpPr>
-          <p:nvPr>
-            <p:ph idx="1"/>
-          </p:nvPr>
-        </p:nvSpPr>
-        <p:spPr/>
-        <p:txBody>
-          <a:bodyPr/>
-          <a:lstStyle/>
-          <a:p>
-            <a:endParaRPr lang="en-US" dirty="0" smtClean="0"/>
-          </a:p>
-          <a:p>
-            <a:endParaRPr lang="en-US" dirty="0"/>
-          </a:p>
-        </p:txBody>
-      </p:sp>
       <p:pic>
         <p:nvPicPr>
-          <p:cNvPr id="5" name="Picture 4"/>
+          <p:cNvPr id="4" name="Picture 3"/>
           <p:cNvPicPr>
             <a:picLocks noChangeAspect="1"/>
           </p:cNvPicPr>
           <p:nvPr/>
         </p:nvPicPr>
-        <p:blipFill>
+        <p:blipFill rotWithShape="1">
           <a:blip r:embed="rId2"/>
-          <a:stretch>
-            <a:fillRect/>
-          </a:stretch>
+          <a:srcRect l="-30" t="-1258" r="2546" b="1258"/>
+          <a:stretch/>
         </p:blipFill>
         <p:spPr>
           <a:xfrm>
-            <a:off x="563879" y="1314450"/>
-            <a:ext cx="7941073" cy="869949"/>
+            <a:off x="2080793" y="67258"/>
+            <a:ext cx="6748248" cy="6790743"/>
           </a:xfrm>
           <a:prstGeom prst="rect">
             <a:avLst/>
           </a:prstGeom>
         </p:spPr>
       </p:pic>
-      <p:pic>
-        <p:nvPicPr>
-          <p:cNvPr id="6" name="Picture 5"/>
-          <p:cNvPicPr>
-            <a:picLocks noChangeAspect="1"/>
-          </p:cNvPicPr>
-          <p:nvPr/>
-        </p:nvPicPr>
-        <p:blipFill>
-          <a:blip r:embed="rId3"/>
-          <a:stretch>
-            <a:fillRect/>
-          </a:stretch>
-        </p:blipFill>
-        <p:spPr>
-          <a:xfrm>
-            <a:off x="563879" y="2451100"/>
-            <a:ext cx="7939588" cy="2466340"/>
-          </a:xfrm>
-          <a:prstGeom prst="rect">
-            <a:avLst/>
-          </a:prstGeom>
-        </p:spPr>
-      </p:pic>
+      <p:sp>
+        <p:nvSpPr>
+          <p:cNvPr id="2" name="Title 1"/>
+          <p:cNvSpPr>
+            <a:spLocks noGrp="1"/>
+          </p:cNvSpPr>
+          <p:nvPr>
+            <p:ph type="title"/>
+          </p:nvPr>
+        </p:nvSpPr>
+        <p:spPr>
+          <a:xfrm>
+            <a:off x="91440" y="152720"/>
+            <a:ext cx="3931920" cy="782001"/>
+          </a:xfrm>
+        </p:spPr>
+        <p:txBody>
+          <a:bodyPr>
+            <a:normAutofit/>
+          </a:bodyPr>
+          <a:lstStyle/>
+          <a:p>
+            <a:r>
+              <a:rPr lang="ru-RU" dirty="0" smtClean="0"/>
+              <a:t>Гравитация</a:t>
+            </a:r>
+            <a:endParaRPr lang="en-US" dirty="0"/>
+          </a:p>
+        </p:txBody>
+      </p:sp>
     </p:spTree>
     <p:extLst>
       <p:ext uri="{BB962C8B-B14F-4D97-AF65-F5344CB8AC3E}">
-        <p14:creationId xmlns:p14="http://schemas.microsoft.com/office/powerpoint/2010/main" val="2618941633"/>
+        <p14:creationId xmlns:p14="http://schemas.microsoft.com/office/powerpoint/2010/main" val="3508750416"/>
       </p:ext>
     </p:extLst>
   </p:cSld>
@@ -3789,45 +3822,115 @@
         </p:nvSpPr>
         <p:spPr/>
         <p:txBody>
+          <a:bodyPr>
+            <a:normAutofit/>
+          </a:bodyPr>
+          <a:lstStyle/>
+          <a:p>
+            <a:r>
+              <a:rPr lang="ru-RU" dirty="0" smtClean="0"/>
+              <a:t>ГРАВИТАЦИЯ В</a:t>
+            </a:r>
+            <a:r>
+              <a:rPr lang="en-US" dirty="0" smtClean="0"/>
+              <a:t/>
+            </a:r>
+            <a:br>
+              <a:rPr lang="en-US" dirty="0" smtClean="0"/>
+            </a:br>
+            <a:r>
+              <a:rPr lang="en-US" dirty="0" smtClean="0"/>
+              <a:t>P2.js </a:t>
+            </a:r>
+            <a:r>
+              <a:rPr lang="ru-RU" dirty="0" smtClean="0"/>
+              <a:t>И</a:t>
+            </a:r>
+            <a:r>
+              <a:rPr lang="en-US" dirty="0" smtClean="0"/>
+              <a:t> </a:t>
+            </a:r>
+            <a:r>
+              <a:rPr lang="en-US" dirty="0" err="1" smtClean="0"/>
+              <a:t>physics.js</a:t>
+            </a:r>
+            <a:endParaRPr lang="en-US" dirty="0"/>
+          </a:p>
+        </p:txBody>
+      </p:sp>
+      <p:sp>
+        <p:nvSpPr>
+          <p:cNvPr id="3" name="Content Placeholder 2"/>
+          <p:cNvSpPr>
+            <a:spLocks noGrp="1"/>
+          </p:cNvSpPr>
+          <p:nvPr>
+            <p:ph idx="1"/>
+          </p:nvPr>
+        </p:nvSpPr>
+        <p:spPr/>
+        <p:txBody>
           <a:bodyPr/>
           <a:lstStyle/>
           <a:p>
-            <a:r>
-              <a:rPr lang="ru-RU" dirty="0" smtClean="0"/>
-              <a:t>Столкновения</a:t>
-            </a:r>
+            <a:endParaRPr lang="en-US" dirty="0" smtClean="0"/>
+          </a:p>
+          <a:p>
             <a:endParaRPr lang="en-US" dirty="0"/>
           </a:p>
         </p:txBody>
       </p:sp>
       <p:pic>
         <p:nvPicPr>
-          <p:cNvPr id="4" name="Content Placeholder 3"/>
+          <p:cNvPr id="6" name="Picture 5"/>
           <p:cNvPicPr>
-            <a:picLocks noGrp="1" noChangeAspect="1"/>
+            <a:picLocks noChangeAspect="1"/>
           </p:cNvPicPr>
-          <p:nvPr>
-            <p:ph idx="1"/>
-          </p:nvPr>
+          <p:nvPr/>
+        </p:nvPicPr>
+        <p:blipFill rotWithShape="1">
+          <a:blip r:embed="rId2"/>
+          <a:srcRect t="-16667" r="1326" b="-16667"/>
+          <a:stretch/>
+        </p:blipFill>
+        <p:spPr>
+          <a:xfrm>
+            <a:off x="-1" y="3268134"/>
+            <a:ext cx="9005729" cy="3730032"/>
+          </a:xfrm>
+          <a:prstGeom prst="rect">
+            <a:avLst/>
+          </a:prstGeom>
+        </p:spPr>
+      </p:pic>
+      <p:pic>
+        <p:nvPicPr>
+          <p:cNvPr id="4" name="Picture 3"/>
+          <p:cNvPicPr>
+            <a:picLocks noChangeAspect="1"/>
+          </p:cNvPicPr>
+          <p:nvPr/>
         </p:nvPicPr>
         <p:blipFill>
-          <a:blip r:embed="rId2"/>
-          <a:srcRect t="6105" b="6105"/>
+          <a:blip r:embed="rId3"/>
           <a:stretch>
             <a:fillRect/>
           </a:stretch>
         </p:blipFill>
         <p:spPr>
           <a:xfrm>
-            <a:off x="457200" y="1314450"/>
-            <a:ext cx="8133898" cy="3501389"/>
-          </a:xfrm>
+            <a:off x="-1" y="1648081"/>
+            <a:ext cx="9005729" cy="1751114"/>
+          </a:xfrm>
+          <a:prstGeom prst="rect">
+            <a:avLst/>
+          </a:prstGeom>
         </p:spPr>
       </p:pic>
     </p:spTree>
     <p:extLst>
       <p:ext uri="{BB962C8B-B14F-4D97-AF65-F5344CB8AC3E}">
-        <p14:creationId xmlns:p14="http://schemas.microsoft.com/office/powerpoint/2010/main" val="4040969558"/>
+        <p14:creationId xmlns:p14="http://schemas.microsoft.com/office/powerpoint/2010/main" val="2618941633"/>
       </p:ext>
     </p:extLst>
   </p:cSld>
@@ -3866,148 +3969,51 @@
         </p:nvSpPr>
         <p:spPr>
           <a:xfrm>
-            <a:off x="457200" y="114539"/>
-            <a:ext cx="7741920" cy="1028700"/>
-          </a:xfrm>
-        </p:spPr>
-        <p:txBody>
-          <a:bodyPr>
-            <a:normAutofit fontScale="90000"/>
-          </a:bodyPr>
-          <a:lstStyle/>
-          <a:p>
+            <a:off x="1" y="256688"/>
+            <a:ext cx="8958214" cy="686701"/>
+          </a:xfrm>
+        </p:spPr>
+        <p:txBody>
+          <a:bodyPr/>
+          <a:lstStyle/>
+          <a:p>
+            <a:pPr algn="ctr"/>
             <a:r>
               <a:rPr lang="ru-RU" dirty="0" smtClean="0"/>
-              <a:t>Столкновения в</a:t>
-            </a:r>
-            <a:r>
-              <a:rPr lang="en-US" dirty="0" smtClean="0"/>
-              <a:t> </a:t>
-            </a:r>
-            <a:r>
-              <a:rPr lang="ru-RU" dirty="0" smtClean="0"/>
-              <a:t/>
-            </a:r>
-            <a:br>
-              <a:rPr lang="ru-RU" dirty="0" smtClean="0"/>
-            </a:br>
-            <a:r>
-              <a:rPr lang="en-US" dirty="0" smtClean="0"/>
-              <a:t>p2.js </a:t>
-            </a:r>
-            <a:r>
-              <a:rPr lang="ru-RU" dirty="0" smtClean="0"/>
-              <a:t>и</a:t>
-            </a:r>
-            <a:r>
-              <a:rPr lang="en-US" dirty="0" smtClean="0"/>
-              <a:t> PHYSICS.JS</a:t>
-            </a:r>
-            <a:endParaRPr lang="en-US" dirty="0"/>
-          </a:p>
-        </p:txBody>
-      </p:sp>
-      <p:sp>
-        <p:nvSpPr>
-          <p:cNvPr id="3" name="Content Placeholder 2"/>
-          <p:cNvSpPr>
-            <a:spLocks noGrp="1"/>
-          </p:cNvSpPr>
-          <p:nvPr>
-            <p:ph idx="1"/>
-          </p:nvPr>
-        </p:nvSpPr>
-        <p:spPr/>
-        <p:txBody>
-          <a:bodyPr/>
-          <a:lstStyle/>
-          <a:p>
-            <a:r>
-              <a:rPr lang="en-US" dirty="0" smtClean="0"/>
-              <a:t>p2.js – </a:t>
-            </a:r>
-            <a:r>
-              <a:rPr lang="ru-RU" dirty="0" smtClean="0">
-                <a:solidFill>
-                  <a:schemeClr val="tx2">
-                    <a:lumMod val="75000"/>
-                  </a:schemeClr>
-                </a:solidFill>
-              </a:rPr>
-              <a:t>идут бесплатно</a:t>
-            </a:r>
-            <a:endParaRPr lang="en-US" dirty="0" smtClean="0">
-              <a:solidFill>
-                <a:schemeClr val="tx2">
-                  <a:lumMod val="75000"/>
-                </a:schemeClr>
-              </a:solidFill>
-            </a:endParaRPr>
-          </a:p>
-          <a:p>
-            <a:r>
-              <a:rPr lang="en-US" dirty="0" err="1" smtClean="0"/>
-              <a:t>PhysicsJS</a:t>
-            </a:r>
-            <a:r>
-              <a:rPr lang="en-US" dirty="0" smtClean="0"/>
-              <a:t> – </a:t>
-            </a:r>
-            <a:r>
-              <a:rPr lang="ru-RU" dirty="0" smtClean="0">
-                <a:solidFill>
-                  <a:srgbClr val="9D1E23"/>
-                </a:solidFill>
-              </a:rPr>
-              <a:t>надо </a:t>
-            </a:r>
-            <a:r>
-              <a:rPr lang="ru-RU" dirty="0" err="1" smtClean="0">
-                <a:solidFill>
-                  <a:srgbClr val="9D1E23"/>
-                </a:solidFill>
-              </a:rPr>
-              <a:t>конфигурять</a:t>
-            </a:r>
-            <a:endParaRPr lang="en-US" dirty="0" smtClean="0">
-              <a:solidFill>
-                <a:srgbClr val="9D1E23"/>
-              </a:solidFill>
-            </a:endParaRPr>
-          </a:p>
-          <a:p>
+              <a:t>Столкновения</a:t>
+            </a:r>
             <a:endParaRPr lang="en-US" dirty="0"/>
           </a:p>
         </p:txBody>
       </p:sp>
       <p:pic>
         <p:nvPicPr>
-          <p:cNvPr id="4" name="Picture 3"/>
+          <p:cNvPr id="4" name="Content Placeholder 3"/>
           <p:cNvPicPr>
-            <a:picLocks noChangeAspect="1"/>
+            <a:picLocks noGrp="1" noChangeAspect="1"/>
           </p:cNvPicPr>
-          <p:nvPr/>
+          <p:nvPr>
+            <p:ph idx="1"/>
+          </p:nvPr>
         </p:nvPicPr>
         <p:blipFill>
           <a:blip r:embed="rId2"/>
+          <a:srcRect t="-8534" b="-8534"/>
           <a:stretch>
             <a:fillRect/>
           </a:stretch>
         </p:blipFill>
         <p:spPr>
           <a:xfrm>
-            <a:off x="457199" y="2336799"/>
-            <a:ext cx="8269097" cy="2257823"/>
-          </a:xfrm>
-          <a:prstGeom prst="rect">
-            <a:avLst/>
-          </a:prstGeom>
+            <a:off x="0" y="1752601"/>
+            <a:ext cx="9068662" cy="5205035"/>
+          </a:xfrm>
         </p:spPr>
       </p:pic>
     </p:spTree>
     <p:extLst>
       <p:ext uri="{BB962C8B-B14F-4D97-AF65-F5344CB8AC3E}">
-        <p14:creationId xmlns:p14="http://schemas.microsoft.com/office/powerpoint/2010/main" val="3843203206"/>
+        <p14:creationId xmlns:p14="http://schemas.microsoft.com/office/powerpoint/2010/main" val="4040969558"/>
       </p:ext>
     </p:extLst>
   </p:cSld>
@@ -4046,8 +4052,8 @@
         </p:nvSpPr>
         <p:spPr>
           <a:xfrm>
-            <a:off x="457200" y="114539"/>
-            <a:ext cx="7620000" cy="1028700"/>
+            <a:off x="457200" y="152719"/>
+            <a:ext cx="7741920" cy="1371600"/>
           </a:xfrm>
         </p:spPr>
         <p:txBody>
@@ -4056,50 +4062,143 @@
           </a:bodyPr>
           <a:lstStyle/>
           <a:p>
+            <a:pPr algn="ctr"/>
             <a:r>
               <a:rPr lang="ru-RU" dirty="0" smtClean="0"/>
-              <a:t>Пример</a:t>
+              <a:t>Столкновения в</a:t>
             </a:r>
             <a:r>
               <a:rPr lang="en-US" dirty="0" smtClean="0"/>
-              <a:t>: </a:t>
+              <a:t> </a:t>
             </a:r>
             <a:r>
               <a:rPr lang="ru-RU" dirty="0" smtClean="0"/>
-              <a:t>столкновения</a:t>
-            </a:r>
+              <a:t/>
+            </a:r>
+            <a:br>
+              <a:rPr lang="ru-RU" dirty="0" smtClean="0"/>
+            </a:br>
+            <a:r>
+              <a:rPr lang="en-US" dirty="0" smtClean="0"/>
+              <a:t>p2.js </a:t>
+            </a:r>
+            <a:r>
+              <a:rPr lang="ru-RU" dirty="0" smtClean="0"/>
+              <a:t>и</a:t>
+            </a:r>
+            <a:r>
+              <a:rPr lang="en-US" dirty="0" smtClean="0"/>
+              <a:t> PHYSICS.JS</a:t>
+            </a:r>
+            <a:endParaRPr lang="en-US" dirty="0"/>
+          </a:p>
+        </p:txBody>
+      </p:sp>
+      <p:sp>
+        <p:nvSpPr>
+          <p:cNvPr id="3" name="Content Placeholder 2"/>
+          <p:cNvSpPr>
+            <a:spLocks noGrp="1"/>
+          </p:cNvSpPr>
+          <p:nvPr>
+            <p:ph idx="1"/>
+          </p:nvPr>
+        </p:nvSpPr>
+        <p:spPr>
+          <a:xfrm>
+            <a:off x="457200" y="2107556"/>
+            <a:ext cx="7620000" cy="1459077"/>
+          </a:xfrm>
+        </p:spPr>
+        <p:txBody>
+          <a:bodyPr/>
+          <a:lstStyle/>
+          <a:p>
+            <a:r>
+              <a:rPr lang="en-US" sz="3200" dirty="0" smtClean="0"/>
+              <a:t>p2.js – </a:t>
+            </a:r>
+            <a:r>
+              <a:rPr lang="ru-RU" sz="3200" dirty="0" smtClean="0">
+                <a:solidFill>
+                  <a:schemeClr val="tx2">
+                    <a:lumMod val="75000"/>
+                  </a:schemeClr>
+                </a:solidFill>
+              </a:rPr>
+              <a:t>идут бесплатно</a:t>
+            </a:r>
+            <a:endParaRPr lang="en-US" sz="3200" dirty="0" smtClean="0">
+              <a:solidFill>
+                <a:schemeClr val="tx2">
+                  <a:lumMod val="75000"/>
+                </a:schemeClr>
+              </a:solidFill>
+            </a:endParaRPr>
+          </a:p>
+          <a:p>
+            <a:r>
+              <a:rPr lang="en-US" sz="3200" dirty="0" err="1" smtClean="0"/>
+              <a:t>PhysicsJS</a:t>
+            </a:r>
+            <a:r>
+              <a:rPr lang="en-US" sz="3200" dirty="0" smtClean="0"/>
+              <a:t> – </a:t>
+            </a:r>
+            <a:r>
+              <a:rPr lang="ru-RU" sz="3200" dirty="0" smtClean="0">
+                <a:solidFill>
+                  <a:srgbClr val="9D1E23"/>
+                </a:solidFill>
+              </a:rPr>
+              <a:t>надо </a:t>
+            </a:r>
+            <a:r>
+              <a:rPr lang="ru-RU" sz="3200" dirty="0" err="1" smtClean="0">
+                <a:solidFill>
+                  <a:srgbClr val="9D1E23"/>
+                </a:solidFill>
+              </a:rPr>
+              <a:t>конфигурять</a:t>
+            </a:r>
+            <a:endParaRPr lang="en-US" dirty="0" smtClean="0">
+              <a:solidFill>
+                <a:srgbClr val="9D1E23"/>
+              </a:solidFill>
+            </a:endParaRPr>
+          </a:p>
+          <a:p>
             <a:endParaRPr lang="en-US" dirty="0"/>
           </a:p>
         </p:txBody>
       </p:sp>
       <p:pic>
         <p:nvPicPr>
-          <p:cNvPr id="6" name="Content Placeholder 5"/>
+          <p:cNvPr id="4" name="Picture 3"/>
           <p:cNvPicPr>
-            <a:picLocks noGrp="1" noChangeAspect="1"/>
+            <a:picLocks noChangeAspect="1"/>
           </p:cNvPicPr>
-          <p:nvPr>
-            <p:ph idx="1"/>
-          </p:nvPr>
+          <p:nvPr/>
         </p:nvPicPr>
-        <p:blipFill>
+        <p:blipFill rotWithShape="1">
           <a:blip r:embed="rId2"/>
-          <a:srcRect l="-1711" r="-1711"/>
-          <a:stretch>
-            <a:fillRect/>
-          </a:stretch>
+          <a:srcRect t="-16667" b="-16667"/>
+          <a:stretch/>
         </p:blipFill>
         <p:spPr>
           <a:xfrm>
-            <a:off x="386080" y="1314450"/>
-            <a:ext cx="8346318" cy="3592829"/>
-          </a:xfrm>
+            <a:off x="0" y="3718616"/>
+            <a:ext cx="9068621" cy="3301504"/>
+          </a:xfrm>
+          <a:prstGeom prst="rect">
+            <a:avLst/>
+          </a:prstGeom>
         </p:spPr>
       </p:pic>
     </p:spTree>
     <p:extLst>
       <p:ext uri="{BB962C8B-B14F-4D97-AF65-F5344CB8AC3E}">
-        <p14:creationId xmlns:p14="http://schemas.microsoft.com/office/powerpoint/2010/main" val="2586572290"/>
+        <p14:creationId xmlns:p14="http://schemas.microsoft.com/office/powerpoint/2010/main" val="3843203206"/>
       </p:ext>
     </p:extLst>
   </p:cSld>
@@ -4138,16 +4237,17 @@
         </p:nvSpPr>
         <p:spPr>
           <a:xfrm>
-            <a:off x="457200" y="114539"/>
-            <a:ext cx="7620000" cy="1028700"/>
+            <a:off x="0" y="152719"/>
+            <a:ext cx="9011218" cy="819999"/>
           </a:xfrm>
         </p:spPr>
         <p:txBody>
           <a:bodyPr>
-            <a:normAutofit fontScale="90000"/>
+            <a:normAutofit/>
           </a:bodyPr>
           <a:lstStyle/>
           <a:p>
+            <a:pPr algn="ctr"/>
             <a:r>
               <a:rPr lang="ru-RU" dirty="0" smtClean="0"/>
               <a:t>Пример</a:t>
@@ -4160,28 +4260,13 @@
               <a:rPr lang="ru-RU" dirty="0" smtClean="0"/>
               <a:t>столкновения</a:t>
             </a:r>
-            <a:r>
-              <a:rPr lang="en-US" dirty="0" smtClean="0"/>
-              <a:t> </a:t>
-            </a:r>
-            <a:r>
-              <a:rPr lang="ru-RU" dirty="0" smtClean="0"/>
-              <a:t/>
-            </a:r>
-            <a:br>
-              <a:rPr lang="ru-RU" dirty="0" smtClean="0"/>
-            </a:br>
-            <a:r>
-              <a:rPr lang="ru-RU" dirty="0" smtClean="0"/>
-              <a:t>Что внутри</a:t>
-            </a:r>
             <a:endParaRPr lang="en-US" dirty="0"/>
           </a:p>
         </p:txBody>
       </p:sp>
       <p:pic>
         <p:nvPicPr>
-          <p:cNvPr id="4" name="Content Placeholder 3"/>
+          <p:cNvPr id="6" name="Content Placeholder 5"/>
           <p:cNvPicPr>
             <a:picLocks noGrp="1" noChangeAspect="1"/>
           </p:cNvPicPr>
@@ -4191,44 +4276,20 @@
         </p:nvPicPr>
         <p:blipFill rotWithShape="1">
           <a:blip r:embed="rId2"/>
-          <a:srcRect t="-5760" b="-3711"/>
+          <a:srcRect t="28905" r="27151" b="195"/>
           <a:stretch/>
         </p:blipFill>
         <p:spPr>
           <a:xfrm>
-            <a:off x="457200" y="1270000"/>
-            <a:ext cx="7620000" cy="1831102"/>
-          </a:xfrm>
-        </p:spPr>
-      </p:pic>
-      <p:pic>
-        <p:nvPicPr>
-          <p:cNvPr id="5" name="Picture 4"/>
-          <p:cNvPicPr>
-            <a:picLocks noChangeAspect="1"/>
-          </p:cNvPicPr>
-          <p:nvPr/>
-        </p:nvPicPr>
-        <p:blipFill>
-          <a:blip r:embed="rId3"/>
-          <a:stretch>
-            <a:fillRect/>
-          </a:stretch>
-        </p:blipFill>
-        <p:spPr>
-          <a:xfrm>
-            <a:off x="457200" y="3451859"/>
-            <a:ext cx="7620000" cy="1564223"/>
-          </a:xfrm>
-          <a:prstGeom prst="rect">
-            <a:avLst/>
-          </a:prstGeom>
+            <a:off x="-1" y="2458815"/>
+            <a:ext cx="9011219" cy="3904382"/>
+          </a:xfrm>
         </p:spPr>
       </p:pic>
     </p:spTree>
     <p:extLst>
       <p:ext uri="{BB962C8B-B14F-4D97-AF65-F5344CB8AC3E}">
-        <p14:creationId xmlns:p14="http://schemas.microsoft.com/office/powerpoint/2010/main" val="252727191"/>
+        <p14:creationId xmlns:p14="http://schemas.microsoft.com/office/powerpoint/2010/main" val="2586572290"/>
       </p:ext>
     </p:extLst>
   </p:cSld>
@@ -4255,9 +4316,63 @@
           <a:chExt cx="0" cy="0"/>
         </a:xfrm>
       </p:grpSpPr>
+      <p:sp>
+        <p:nvSpPr>
+          <p:cNvPr id="2" name="Title 1"/>
+          <p:cNvSpPr>
+            <a:spLocks noGrp="1"/>
+          </p:cNvSpPr>
+          <p:nvPr>
+            <p:ph type="title"/>
+          </p:nvPr>
+        </p:nvSpPr>
+        <p:spPr>
+          <a:xfrm>
+            <a:off x="457200" y="152719"/>
+            <a:ext cx="7620000" cy="1371600"/>
+          </a:xfrm>
+        </p:spPr>
+        <p:txBody>
+          <a:bodyPr>
+            <a:normAutofit/>
+          </a:bodyPr>
+          <a:lstStyle/>
+          <a:p>
+            <a:pPr algn="ctr"/>
+            <a:r>
+              <a:rPr lang="ru-RU" dirty="0" smtClean="0"/>
+              <a:t>Пример</a:t>
+            </a:r>
+            <a:r>
+              <a:rPr lang="en-US" dirty="0" smtClean="0"/>
+              <a:t>: </a:t>
+            </a:r>
+            <a:r>
+              <a:rPr lang="ru-RU" dirty="0" smtClean="0"/>
+              <a:t>столкновения</a:t>
+            </a:r>
+            <a:r>
+              <a:rPr lang="en-US" dirty="0" smtClean="0"/>
+              <a:t> </a:t>
+            </a:r>
+            <a:r>
+              <a:rPr lang="ru-RU" dirty="0" smtClean="0"/>
+              <a:t/>
+            </a:r>
+            <a:br>
+              <a:rPr lang="ru-RU" dirty="0" smtClean="0"/>
+            </a:br>
+            <a:r>
+              <a:rPr lang="ru-RU" dirty="0" smtClean="0"/>
+              <a:t>Что внутри</a:t>
+            </a:r>
+            <a:endParaRPr lang="en-US" dirty="0"/>
+          </a:p>
+        </p:txBody>
+      </p:sp>
       <p:pic>
         <p:nvPicPr>
-          <p:cNvPr id="4" name="Content Placeholder 3"/>
+          <p:cNvPr id="6" name="Content Placeholder 5"/>
           <p:cNvPicPr>
             <a:picLocks noGrp="1" noChangeAspect="1"/>
           </p:cNvPicPr>
@@ -4267,50 +4382,44 @@
         </p:nvPicPr>
         <p:blipFill rotWithShape="1">
           <a:blip r:embed="rId2"/>
-          <a:srcRect l="-568" r="-862"/>
+          <a:srcRect t="299" r="955" b="896"/>
           <a:stretch/>
         </p:blipFill>
         <p:spPr>
           <a:xfrm>
-            <a:off x="2580639" y="0"/>
-            <a:ext cx="6456773" cy="5143500"/>
+            <a:off x="-1" y="1621196"/>
+            <a:ext cx="9144001" cy="3208209"/>
           </a:xfrm>
         </p:spPr>
       </p:pic>
-      <p:sp>
-        <p:nvSpPr>
-          <p:cNvPr id="2" name="Title 1"/>
-          <p:cNvSpPr>
-            <a:spLocks noGrp="1"/>
-          </p:cNvSpPr>
-          <p:nvPr>
-            <p:ph type="title"/>
-          </p:nvPr>
-        </p:nvSpPr>
-        <p:spPr>
-          <a:xfrm>
-            <a:off x="10160" y="114539"/>
-            <a:ext cx="2570479" cy="505221"/>
-          </a:xfrm>
-        </p:spPr>
-        <p:txBody>
-          <a:bodyPr>
-            <a:normAutofit fontScale="90000"/>
-          </a:bodyPr>
-          <a:lstStyle/>
-          <a:p>
-            <a:r>
-              <a:rPr lang="ru-RU" dirty="0" smtClean="0"/>
-              <a:t>ТРЕНИЕ</a:t>
-            </a:r>
-            <a:endParaRPr lang="en-US" dirty="0"/>
-          </a:p>
-        </p:txBody>
-      </p:sp>
+      <p:pic>
+        <p:nvPicPr>
+          <p:cNvPr id="7" name="Picture 6"/>
+          <p:cNvPicPr>
+            <a:picLocks noChangeAspect="1"/>
+          </p:cNvPicPr>
+          <p:nvPr/>
+        </p:nvPicPr>
+        <p:blipFill>
+          <a:blip r:embed="rId3"/>
+          <a:stretch>
+            <a:fillRect/>
+          </a:stretch>
+        </p:blipFill>
+        <p:spPr>
+          <a:xfrm>
+            <a:off x="0" y="5026988"/>
+            <a:ext cx="9155060" cy="1831012"/>
+          </a:xfrm>
+          <a:prstGeom prst="rect">
+            <a:avLst/>
+          </a:prstGeom>
+        </p:spPr>
+      </p:pic>
     </p:spTree>
     <p:extLst>
       <p:ext uri="{BB962C8B-B14F-4D97-AF65-F5344CB8AC3E}">
-        <p14:creationId xmlns:p14="http://schemas.microsoft.com/office/powerpoint/2010/main" val="1620044044"/>
+        <p14:creationId xmlns:p14="http://schemas.microsoft.com/office/powerpoint/2010/main" val="252727191"/>
       </p:ext>
     </p:extLst>
   </p:cSld>
@@ -4337,29 +4446,6 @@
           <a:chExt cx="0" cy="0"/>
         </a:xfrm>
       </p:grpSpPr>
-      <p:sp>
-        <p:nvSpPr>
-          <p:cNvPr id="2" name="Title 1"/>
-          <p:cNvSpPr>
-            <a:spLocks noGrp="1"/>
-          </p:cNvSpPr>
-          <p:nvPr>
-            <p:ph type="title"/>
-          </p:nvPr>
-        </p:nvSpPr>
-        <p:spPr/>
-        <p:txBody>
-          <a:bodyPr/>
-          <a:lstStyle/>
-          <a:p>
-            <a:r>
-              <a:rPr lang="ru-RU" dirty="0" smtClean="0"/>
-              <a:t>Пример: ТРЕНИЕ</a:t>
-            </a:r>
-            <a:endParaRPr lang="en-US" dirty="0"/>
-          </a:p>
-        </p:txBody>
-      </p:sp>
       <p:pic>
         <p:nvPicPr>
           <p:cNvPr id="4" name="Content Placeholder 3"/>
@@ -4370,24 +4456,53 @@
             <p:ph idx="1"/>
           </p:nvPr>
         </p:nvPicPr>
-        <p:blipFill>
+        <p:blipFill rotWithShape="1">
           <a:blip r:embed="rId2"/>
-          <a:srcRect t="-8047" b="-8047"/>
-          <a:stretch>
-            <a:fillRect/>
-          </a:stretch>
+          <a:srcRect t="113" b="1007"/>
+          <a:stretch/>
         </p:blipFill>
         <p:spPr>
           <a:xfrm>
-            <a:off x="457200" y="1314450"/>
-            <a:ext cx="8239760" cy="3546959"/>
+            <a:off x="1418639" y="826347"/>
+            <a:ext cx="7580111" cy="6056050"/>
           </a:xfrm>
         </p:spPr>
       </p:pic>
+      <p:sp>
+        <p:nvSpPr>
+          <p:cNvPr id="2" name="Title 1"/>
+          <p:cNvSpPr>
+            <a:spLocks noGrp="1"/>
+          </p:cNvSpPr>
+          <p:nvPr>
+            <p:ph type="title"/>
+          </p:nvPr>
+        </p:nvSpPr>
+        <p:spPr>
+          <a:xfrm>
+            <a:off x="10161" y="0"/>
+            <a:ext cx="8988589" cy="648479"/>
+          </a:xfrm>
+        </p:spPr>
+        <p:txBody>
+          <a:bodyPr>
+            <a:normAutofit/>
+          </a:bodyPr>
+          <a:lstStyle/>
+          <a:p>
+            <a:pPr algn="ctr"/>
+            <a:r>
+              <a:rPr lang="ru-RU" dirty="0" smtClean="0"/>
+              <a:t>ТРЕНИЕ</a:t>
+            </a:r>
+            <a:endParaRPr lang="en-US" dirty="0"/>
+          </a:p>
+        </p:txBody>
+      </p:sp>
     </p:spTree>
     <p:extLst>
       <p:ext uri="{BB962C8B-B14F-4D97-AF65-F5344CB8AC3E}">
-        <p14:creationId xmlns:p14="http://schemas.microsoft.com/office/powerpoint/2010/main" val="3608457292"/>
+        <p14:creationId xmlns:p14="http://schemas.microsoft.com/office/powerpoint/2010/main" val="1620044044"/>
       </p:ext>
     </p:extLst>
   </p:cSld>
@@ -4424,39 +4539,20 @@
             <p:ph type="title"/>
           </p:nvPr>
         </p:nvSpPr>
-        <p:spPr/>
-        <p:txBody>
-          <a:bodyPr>
-            <a:normAutofit fontScale="90000"/>
-          </a:bodyPr>
-          <a:lstStyle/>
-          <a:p>
+        <p:spPr>
+          <a:xfrm>
+            <a:off x="1941" y="152719"/>
+            <a:ext cx="8972138" cy="792979"/>
+          </a:xfrm>
+        </p:spPr>
+        <p:txBody>
+          <a:bodyPr/>
+          <a:lstStyle/>
+          <a:p>
+            <a:pPr algn="ctr"/>
             <a:r>
               <a:rPr lang="ru-RU" dirty="0" smtClean="0"/>
-              <a:t>Пример</a:t>
-            </a:r>
-            <a:r>
-              <a:rPr lang="en-US" dirty="0" smtClean="0"/>
-              <a:t>: </a:t>
-            </a:r>
-            <a:r>
-              <a:rPr lang="ru-RU" dirty="0" smtClean="0"/>
-              <a:t>Трение</a:t>
-            </a:r>
-            <a:r>
-              <a:rPr lang="ru-RU" dirty="0"/>
-              <a:t/>
-            </a:r>
-            <a:br>
-              <a:rPr lang="ru-RU" dirty="0"/>
-            </a:br>
-            <a:r>
-              <a:rPr lang="en-US" dirty="0" err="1" smtClean="0"/>
-              <a:t>Ч</a:t>
-            </a:r>
-            <a:r>
-              <a:rPr lang="ru-RU" dirty="0" smtClean="0"/>
-              <a:t>то внутри</a:t>
+              <a:t>Пример: ТРЕНИЕ</a:t>
             </a:r>
             <a:endParaRPr lang="en-US" dirty="0"/>
           </a:p>
@@ -4474,44 +4570,20 @@
         </p:nvPicPr>
         <p:blipFill rotWithShape="1">
           <a:blip r:embed="rId2"/>
-          <a:srcRect t="-3307" b="-3024"/>
+          <a:srcRect l="19071" t="34" b="-476"/>
           <a:stretch/>
         </p:blipFill>
         <p:spPr>
           <a:xfrm>
-            <a:off x="457199" y="1442721"/>
-            <a:ext cx="8039489" cy="1432560"/>
-          </a:xfrm>
-        </p:spPr>
-      </p:pic>
-      <p:pic>
-        <p:nvPicPr>
-          <p:cNvPr id="6" name="Picture 5"/>
-          <p:cNvPicPr>
-            <a:picLocks noChangeAspect="1"/>
-          </p:cNvPicPr>
-          <p:nvPr/>
-        </p:nvPicPr>
-        <p:blipFill>
-          <a:blip r:embed="rId3"/>
-          <a:stretch>
-            <a:fillRect/>
-          </a:stretch>
-        </p:blipFill>
-        <p:spPr>
-          <a:xfrm>
-            <a:off x="457199" y="3042920"/>
-            <a:ext cx="8062653" cy="1722120"/>
-          </a:xfrm>
-          <a:prstGeom prst="rect">
-            <a:avLst/>
-          </a:prstGeom>
+            <a:off x="1940" y="2593915"/>
+            <a:ext cx="8972139" cy="4128985"/>
+          </a:xfrm>
         </p:spPr>
       </p:pic>
     </p:spTree>
     <p:extLst>
       <p:ext uri="{BB962C8B-B14F-4D97-AF65-F5344CB8AC3E}">
-        <p14:creationId xmlns:p14="http://schemas.microsoft.com/office/powerpoint/2010/main" val="1400719147"/>
+        <p14:creationId xmlns:p14="http://schemas.microsoft.com/office/powerpoint/2010/main" val="3608457292"/>
       </p:ext>
     </p:extLst>
   </p:cSld>
@@ -4550,8 +4622,8 @@
         </p:nvSpPr>
         <p:spPr>
           <a:xfrm>
-            <a:off x="457200" y="114539"/>
-            <a:ext cx="7752080" cy="769381"/>
+            <a:off x="1" y="152719"/>
+            <a:ext cx="8944702" cy="1371600"/>
           </a:xfrm>
         </p:spPr>
         <p:txBody>
@@ -4560,9 +4632,33 @@
           </a:bodyPr>
           <a:lstStyle/>
           <a:p>
+            <a:pPr algn="ctr"/>
             <a:r>
               <a:rPr lang="ru-RU" dirty="0" smtClean="0"/>
-              <a:t>упругость</a:t>
+              <a:t>Пример</a:t>
+            </a:r>
+            <a:r>
+              <a:rPr lang="en-US" dirty="0" smtClean="0"/>
+              <a:t>: </a:t>
+            </a:r>
+            <a:r>
+              <a:rPr lang="ru-RU" dirty="0" smtClean="0"/>
+              <a:t>Трение</a:t>
+            </a:r>
+            <a:r>
+              <a:rPr lang="ru-RU" dirty="0"/>
+              <a:t/>
+            </a:r>
+            <a:br>
+              <a:rPr lang="ru-RU" dirty="0"/>
+            </a:br>
+            <a:r>
+              <a:rPr lang="en-US" dirty="0" err="1" smtClean="0"/>
+              <a:t>Ч</a:t>
+            </a:r>
+            <a:r>
+              <a:rPr lang="ru-RU" dirty="0" smtClean="0"/>
+              <a:t>то внутри</a:t>
             </a:r>
             <a:endParaRPr lang="en-US" dirty="0"/>
           </a:p>
@@ -4570,7 +4666,7 @@
       </p:sp>
       <p:pic>
         <p:nvPicPr>
-          <p:cNvPr id="4" name="Content Placeholder 3"/>
+          <p:cNvPr id="5" name="Content Placeholder 4"/>
           <p:cNvPicPr>
             <a:picLocks noGrp="1" noChangeAspect="1"/>
           </p:cNvPicPr>
@@ -4578,38 +4674,35 @@
             <p:ph idx="1"/>
           </p:nvPr>
         </p:nvPicPr>
-        <p:blipFill>
+        <p:blipFill rotWithShape="1">
           <a:blip r:embed="rId2"/>
-          <a:srcRect l="-32945" r="-32945"/>
-          <a:stretch>
-            <a:fillRect/>
-          </a:stretch>
+          <a:srcRect l="2808" t="1" r="15763" b="-2867"/>
+          <a:stretch/>
         </p:blipFill>
         <p:spPr>
           <a:xfrm>
-            <a:off x="-843280" y="1098979"/>
-            <a:ext cx="5892800" cy="4044521"/>
+            <a:off x="-1" y="2337225"/>
+            <a:ext cx="9144001" cy="1513117"/>
           </a:xfrm>
         </p:spPr>
       </p:pic>
       <p:pic>
         <p:nvPicPr>
-          <p:cNvPr id="5" name="Picture 4"/>
+          <p:cNvPr id="7" name="Picture 6"/>
           <p:cNvPicPr>
             <a:picLocks noChangeAspect="1"/>
           </p:cNvPicPr>
           <p:nvPr/>
         </p:nvPicPr>
-        <p:blipFill>
+        <p:blipFill rotWithShape="1">
           <a:blip r:embed="rId3"/>
-          <a:stretch>
-            <a:fillRect/>
-          </a:stretch>
+          <a:srcRect l="7049" r="6466"/>
+          <a:stretch/>
         </p:blipFill>
         <p:spPr>
           <a:xfrm>
-            <a:off x="4144473" y="1838960"/>
-            <a:ext cx="4868637" cy="3304540"/>
+            <a:off x="1" y="4203700"/>
+            <a:ext cx="9091359" cy="1929828"/>
           </a:xfrm>
           <a:prstGeom prst="rect">
             <a:avLst/>
@@ -4619,7 +4712,7 @@
     </p:spTree>
     <p:extLst>
       <p:ext uri="{BB962C8B-B14F-4D97-AF65-F5344CB8AC3E}">
-        <p14:creationId xmlns:p14="http://schemas.microsoft.com/office/powerpoint/2010/main" val="454711049"/>
+        <p14:creationId xmlns:p14="http://schemas.microsoft.com/office/powerpoint/2010/main" val="1400719147"/>
       </p:ext>
     </p:extLst>
   </p:cSld>
@@ -4656,11 +4749,17 @@
             <p:ph type="title"/>
           </p:nvPr>
         </p:nvSpPr>
-        <p:spPr/>
+        <p:spPr>
+          <a:xfrm>
+            <a:off x="1" y="152719"/>
+            <a:ext cx="8971726" cy="819999"/>
+          </a:xfrm>
+        </p:spPr>
         <p:txBody>
           <a:bodyPr/>
           <a:lstStyle/>
           <a:p>
+            <a:pPr algn="ctr"/>
             <a:r>
               <a:rPr lang="ru-RU" dirty="0" smtClean="0">
                 <a:solidFill>
@@ -4689,7 +4788,9 @@
         </p:nvSpPr>
         <p:spPr/>
         <p:txBody>
-          <a:bodyPr/>
+          <a:bodyPr>
+            <a:normAutofit/>
+          </a:bodyPr>
           <a:lstStyle/>
           <a:p>
             <a:pPr marL="342900" indent="-342900">
@@ -4697,19 +4798,19 @@
               <a:buChar char="•"/>
             </a:pPr>
             <a:r>
-              <a:rPr lang="en-US" dirty="0" smtClean="0"/>
+              <a:rPr lang="en-US" sz="2800" dirty="0" smtClean="0"/>
               <a:t>2D</a:t>
             </a:r>
             <a:r>
-              <a:rPr lang="ru-RU" dirty="0" smtClean="0"/>
+              <a:rPr lang="ru-RU" sz="2800" dirty="0" smtClean="0"/>
               <a:t>: </a:t>
             </a:r>
             <a:r>
-              <a:rPr lang="en-US" dirty="0" err="1" smtClean="0"/>
+              <a:rPr lang="en-US" sz="2800" dirty="0" err="1" smtClean="0"/>
               <a:t>PhysicsJS</a:t>
             </a:r>
             <a:r>
-              <a:rPr lang="en-US" dirty="0" smtClean="0"/>
+              <a:rPr lang="en-US" sz="2800" dirty="0" smtClean="0"/>
               <a:t>, p2.js</a:t>
             </a:r>
           </a:p>
@@ -4719,7 +4820,7 @@
               <a:buChar char="•"/>
             </a:pPr>
             <a:r>
-              <a:rPr lang="ru-RU" dirty="0" smtClean="0"/>
+              <a:rPr lang="ru-RU" sz="2800" dirty="0" smtClean="0"/>
               <a:t>Основные компоненты</a:t>
             </a:r>
           </a:p>
@@ -4729,9 +4830,14 @@
               <a:buChar char="•"/>
             </a:pPr>
             <a:r>
-              <a:rPr lang="ru-RU" dirty="0" smtClean="0"/>
-              <a:t>Взаимодействие</a:t>
-            </a:r>
+              <a:rPr lang="ru-RU" sz="2800" dirty="0" smtClean="0"/>
+              <a:t>Силы </a:t>
+            </a:r>
+            <a:r>
+              <a:rPr lang="ru-RU" sz="2800" dirty="0" smtClean="0"/>
+              <a:t>и взаимодействие</a:t>
+            </a:r>
+            <a:endParaRPr lang="ru-RU" sz="2800" dirty="0" smtClean="0"/>
           </a:p>
           <a:p>
             <a:pPr marL="342900" indent="-342900">
@@ -4739,7 +4845,7 @@
               <a:buChar char="•"/>
             </a:pPr>
             <a:r>
-              <a:rPr lang="ru-RU" dirty="0" smtClean="0"/>
+              <a:rPr lang="ru-RU" sz="2800" dirty="0" smtClean="0"/>
               <a:t>Составные объекты и связи</a:t>
             </a:r>
           </a:p>
@@ -4749,7 +4855,7 @@
               <a:buChar char="•"/>
             </a:pPr>
             <a:r>
-              <a:rPr lang="ru-RU" dirty="0" smtClean="0"/>
+              <a:rPr lang="ru-RU" sz="2800" dirty="0" smtClean="0"/>
               <a:t>Разрушение</a:t>
             </a:r>
           </a:p>
@@ -4759,7 +4865,7 @@
               <a:buChar char="•"/>
             </a:pPr>
             <a:r>
-              <a:rPr lang="ru-RU" strike="sngStrike" dirty="0" smtClean="0">
+              <a:rPr lang="ru-RU" sz="2800" strike="sngStrike" dirty="0" smtClean="0">
                 <a:solidFill>
                   <a:schemeClr val="bg1">
                     <a:lumMod val="75000"/>
@@ -4768,7 +4874,7 @@
               </a:rPr>
               <a:t>Из чего выбирать</a:t>
             </a:r>
-            <a:endParaRPr lang="en-US" strike="sngStrike" dirty="0">
+            <a:endParaRPr lang="en-US" sz="2800" strike="sngStrike" dirty="0">
               <a:solidFill>
                 <a:schemeClr val="bg1">
                   <a:lumMod val="75000"/>
@@ -4808,40 +4914,9 @@
           <a:chExt cx="0" cy="0"/>
         </a:xfrm>
       </p:grpSpPr>
-      <p:sp>
-        <p:nvSpPr>
-          <p:cNvPr id="2" name="Title 1"/>
-          <p:cNvSpPr>
-            <a:spLocks noGrp="1"/>
-          </p:cNvSpPr>
-          <p:nvPr>
-            <p:ph type="title"/>
-          </p:nvPr>
-        </p:nvSpPr>
-        <p:spPr/>
-        <p:txBody>
-          <a:bodyPr/>
-          <a:lstStyle/>
-          <a:p>
-            <a:r>
-              <a:rPr lang="ru-RU" dirty="0" smtClean="0"/>
-              <a:t>Пример</a:t>
-            </a:r>
-            <a:r>
-              <a:rPr lang="en-US" dirty="0" smtClean="0"/>
-              <a:t>: </a:t>
-            </a:r>
-            <a:r>
-              <a:rPr lang="ru-RU" dirty="0" smtClean="0"/>
-              <a:t>упругость</a:t>
-            </a:r>
-            <a:endParaRPr lang="en-US" dirty="0"/>
-          </a:p>
-        </p:txBody>
-      </p:sp>
       <p:pic>
         <p:nvPicPr>
-          <p:cNvPr id="6" name="Content Placeholder 5"/>
+          <p:cNvPr id="4" name="Content Placeholder 3"/>
           <p:cNvPicPr>
             <a:picLocks noGrp="1" noChangeAspect="1"/>
           </p:cNvPicPr>
@@ -4851,22 +4926,76 @@
         </p:nvPicPr>
         <p:blipFill>
           <a:blip r:embed="rId2"/>
-          <a:srcRect l="10899" r="10899"/>
+          <a:srcRect t="-14077" b="-14077"/>
           <a:stretch>
             <a:fillRect/>
           </a:stretch>
         </p:blipFill>
         <p:spPr>
           <a:xfrm>
-            <a:off x="457200" y="1314450"/>
-            <a:ext cx="8086696" cy="3481070"/>
+            <a:off x="0" y="-509268"/>
+            <a:ext cx="5892800" cy="5392695"/>
           </a:xfrm>
         </p:spPr>
       </p:pic>
+      <p:pic>
+        <p:nvPicPr>
+          <p:cNvPr id="5" name="Picture 4"/>
+          <p:cNvPicPr>
+            <a:picLocks noChangeAspect="1"/>
+          </p:cNvPicPr>
+          <p:nvPr/>
+        </p:nvPicPr>
+        <p:blipFill rotWithShape="1">
+          <a:blip r:embed="rId3"/>
+          <a:srcRect t="-16667" b="-16667"/>
+          <a:stretch/>
+        </p:blipFill>
+        <p:spPr>
+          <a:xfrm>
+            <a:off x="3418444" y="2470397"/>
+            <a:ext cx="5594667" cy="5063101"/>
+          </a:xfrm>
+          <a:prstGeom prst="rect">
+            <a:avLst/>
+          </a:prstGeom>
+        </p:spPr>
+      </p:pic>
+      <p:sp>
+        <p:nvSpPr>
+          <p:cNvPr id="2" name="Title 1"/>
+          <p:cNvSpPr>
+            <a:spLocks noGrp="1"/>
+          </p:cNvSpPr>
+          <p:nvPr>
+            <p:ph type="title"/>
+          </p:nvPr>
+        </p:nvSpPr>
+        <p:spPr>
+          <a:xfrm>
+            <a:off x="121605" y="152721"/>
+            <a:ext cx="8796075" cy="617348"/>
+          </a:xfrm>
+        </p:spPr>
+        <p:txBody>
+          <a:bodyPr>
+            <a:normAutofit fontScale="90000"/>
+          </a:bodyPr>
+          <a:lstStyle/>
+          <a:p>
+            <a:pPr algn="ctr"/>
+            <a:r>
+              <a:rPr lang="ru-RU" dirty="0" smtClean="0"/>
+              <a:t>упругость</a:t>
+            </a:r>
+            <a:endParaRPr lang="en-US" dirty="0"/>
+          </a:p>
+        </p:txBody>
+      </p:sp>
     </p:spTree>
     <p:extLst>
       <p:ext uri="{BB962C8B-B14F-4D97-AF65-F5344CB8AC3E}">
-        <p14:creationId xmlns:p14="http://schemas.microsoft.com/office/powerpoint/2010/main" val="1505509381"/>
+        <p14:creationId xmlns:p14="http://schemas.microsoft.com/office/powerpoint/2010/main" val="454711049"/>
       </p:ext>
     </p:extLst>
   </p:cSld>
@@ -4905,16 +5034,15 @@
         </p:nvSpPr>
         <p:spPr>
           <a:xfrm>
-            <a:off x="457200" y="114539"/>
-            <a:ext cx="6634480" cy="1028700"/>
-          </a:xfrm>
-        </p:spPr>
-        <p:txBody>
-          <a:bodyPr>
-            <a:normAutofit fontScale="90000"/>
-          </a:bodyPr>
-          <a:lstStyle/>
-          <a:p>
+            <a:off x="135117" y="368878"/>
+            <a:ext cx="8742028" cy="644369"/>
+          </a:xfrm>
+        </p:spPr>
+        <p:txBody>
+          <a:bodyPr/>
+          <a:lstStyle/>
+          <a:p>
+            <a:pPr algn="ctr"/>
             <a:r>
               <a:rPr lang="ru-RU" dirty="0" smtClean="0"/>
               <a:t>Пример</a:t>
@@ -4927,20 +5055,13 @@
               <a:rPr lang="ru-RU" dirty="0" smtClean="0"/>
               <a:t>упругость</a:t>
             </a:r>
-            <a:br>
-              <a:rPr lang="ru-RU" dirty="0" smtClean="0"/>
-            </a:br>
-            <a:r>
-              <a:rPr lang="ru-RU" dirty="0" smtClean="0"/>
-              <a:t>что внутри</a:t>
-            </a:r>
             <a:endParaRPr lang="en-US" dirty="0"/>
           </a:p>
         </p:txBody>
       </p:sp>
       <p:pic>
         <p:nvPicPr>
-          <p:cNvPr id="4" name="Content Placeholder 3"/>
+          <p:cNvPr id="6" name="Content Placeholder 5"/>
           <p:cNvPicPr>
             <a:picLocks noGrp="1" noChangeAspect="1"/>
           </p:cNvPicPr>
@@ -4950,128 +5071,20 @@
         </p:nvPicPr>
         <p:blipFill rotWithShape="1">
           <a:blip r:embed="rId2"/>
-          <a:srcRect b="-10649"/>
+          <a:srcRect l="20170" t="18272" r="14748" b="618"/>
           <a:stretch/>
         </p:blipFill>
         <p:spPr>
           <a:xfrm>
-            <a:off x="538480" y="1219199"/>
-            <a:ext cx="7620000" cy="1595121"/>
+            <a:off x="18510" y="2999214"/>
+            <a:ext cx="8953218" cy="3755771"/>
           </a:xfrm>
         </p:spPr>
       </p:pic>
-      <p:pic>
-        <p:nvPicPr>
-          <p:cNvPr id="5" name="Picture 4"/>
-          <p:cNvPicPr>
-            <a:picLocks noChangeAspect="1"/>
-          </p:cNvPicPr>
-          <p:nvPr/>
-        </p:nvPicPr>
-        <p:blipFill>
-          <a:blip r:embed="rId3"/>
-          <a:stretch>
-            <a:fillRect/>
-          </a:stretch>
-        </p:blipFill>
-        <p:spPr>
-          <a:xfrm>
-            <a:off x="538480" y="3416300"/>
-            <a:ext cx="1752600" cy="1727200"/>
-          </a:xfrm>
-          <a:prstGeom prst="rect">
-            <a:avLst/>
-          </a:prstGeom>
-        </p:spPr>
-      </p:pic>
-      <p:pic>
-        <p:nvPicPr>
-          <p:cNvPr id="6" name="Picture 5"/>
-          <p:cNvPicPr>
-            <a:picLocks noChangeAspect="1"/>
-          </p:cNvPicPr>
-          <p:nvPr/>
-        </p:nvPicPr>
-        <p:blipFill>
-          <a:blip r:embed="rId4"/>
-          <a:stretch>
-            <a:fillRect/>
-          </a:stretch>
-        </p:blipFill>
-        <p:spPr>
-          <a:xfrm>
-            <a:off x="2844800" y="3271520"/>
-            <a:ext cx="5133637" cy="1557700"/>
-          </a:xfrm>
-          <a:prstGeom prst="rect">
-            <a:avLst/>
-          </a:prstGeom>
-        </p:spPr>
-      </p:pic>
-      <p:sp>
-        <p:nvSpPr>
-          <p:cNvPr id="7" name="TextBox 6"/>
-          <p:cNvSpPr txBox="1"/>
-          <p:nvPr/>
-        </p:nvSpPr>
-        <p:spPr>
-          <a:xfrm>
-            <a:off x="4785360" y="2814320"/>
-            <a:ext cx="1185541" cy="369332"/>
-          </a:xfrm>
-          <a:prstGeom prst="rect">
-            <a:avLst/>
-          </a:prstGeom>
-          <a:noFill/>
-        </p:spPr>
-        <p:txBody>
-          <a:bodyPr wrap="none" rtlCol="0">
-            <a:spAutoFit/>
-          </a:bodyPr>
-          <a:lstStyle/>
-          <a:p>
-            <a:r>
-              <a:rPr lang="en-US" dirty="0" smtClean="0"/>
-              <a:t>relaxation</a:t>
-            </a:r>
-            <a:endParaRPr lang="en-US" dirty="0"/>
-          </a:p>
-        </p:txBody>
-      </p:sp>
-      <p:sp>
-        <p:nvSpPr>
-          <p:cNvPr id="8" name="TextBox 7"/>
-          <p:cNvSpPr txBox="1"/>
-          <p:nvPr/>
-        </p:nvSpPr>
-        <p:spPr>
-          <a:xfrm>
-            <a:off x="904240" y="2814320"/>
-            <a:ext cx="1027182" cy="369332"/>
-          </a:xfrm>
-          <a:prstGeom prst="rect">
-            <a:avLst/>
-          </a:prstGeom>
-          <a:noFill/>
-        </p:spPr>
-        <p:txBody>
-          <a:bodyPr wrap="none" rtlCol="0">
-            <a:spAutoFit/>
-          </a:bodyPr>
-          <a:lstStyle/>
-          <a:p>
-            <a:r>
-              <a:rPr lang="en-US" dirty="0" smtClean="0"/>
-              <a:t>stiffness</a:t>
-            </a:r>
-            <a:endParaRPr lang="en-US" dirty="0"/>
-          </a:p>
-        </p:txBody>
-      </p:sp>
     </p:spTree>
     <p:extLst>
       <p:ext uri="{BB962C8B-B14F-4D97-AF65-F5344CB8AC3E}">
-        <p14:creationId xmlns:p14="http://schemas.microsoft.com/office/powerpoint/2010/main" val="1372215469"/>
+        <p14:creationId xmlns:p14="http://schemas.microsoft.com/office/powerpoint/2010/main" val="1505509381"/>
       </p:ext>
     </p:extLst>
   </p:cSld>
@@ -5108,16 +5121,37 @@
             <p:ph type="title"/>
           </p:nvPr>
         </p:nvSpPr>
-        <p:spPr/>
+        <p:spPr>
+          <a:xfrm>
+            <a:off x="0" y="152719"/>
+            <a:ext cx="8985238" cy="1371600"/>
+          </a:xfrm>
+        </p:spPr>
         <p:txBody>
           <a:bodyPr>
             <a:normAutofit/>
           </a:bodyPr>
           <a:lstStyle/>
           <a:p>
+            <a:pPr algn="ctr"/>
             <a:r>
               <a:rPr lang="ru-RU" dirty="0" smtClean="0"/>
-              <a:t>импульс</a:t>
+              <a:t>Пример</a:t>
+            </a:r>
+            <a:r>
+              <a:rPr lang="en-US" dirty="0" smtClean="0"/>
+              <a:t>: </a:t>
+            </a:r>
+            <a:r>
+              <a:rPr lang="ru-RU" dirty="0" smtClean="0"/>
+              <a:t>упругость</a:t>
+            </a:r>
+            <a:br>
+              <a:rPr lang="ru-RU" dirty="0" smtClean="0"/>
+            </a:br>
+            <a:r>
+              <a:rPr lang="ru-RU" dirty="0" smtClean="0"/>
+              <a:t>что внутри</a:t>
             </a:r>
             <a:endParaRPr lang="en-US" dirty="0"/>
           </a:p>
@@ -5125,7 +5159,113 @@
       </p:sp>
       <p:pic>
         <p:nvPicPr>
-          <p:cNvPr id="4" name="Content Placeholder 3"/>
+          <p:cNvPr id="5" name="Picture 4"/>
+          <p:cNvPicPr>
+            <a:picLocks noChangeAspect="1"/>
+          </p:cNvPicPr>
+          <p:nvPr/>
+        </p:nvPicPr>
+        <p:blipFill rotWithShape="1">
+          <a:blip r:embed="rId2"/>
+          <a:srcRect t="-16667" b="-16667"/>
+          <a:stretch/>
+        </p:blipFill>
+        <p:spPr>
+          <a:xfrm>
+            <a:off x="538480" y="4717187"/>
+            <a:ext cx="1752600" cy="2302933"/>
+          </a:xfrm>
+          <a:prstGeom prst="rect">
+            <a:avLst/>
+          </a:prstGeom>
+        </p:spPr>
+      </p:pic>
+      <p:pic>
+        <p:nvPicPr>
+          <p:cNvPr id="6" name="Picture 5"/>
+          <p:cNvPicPr>
+            <a:picLocks noChangeAspect="1"/>
+          </p:cNvPicPr>
+          <p:nvPr/>
+        </p:nvPicPr>
+        <p:blipFill rotWithShape="1">
+          <a:blip r:embed="rId3"/>
+          <a:srcRect t="-16667" b="-16667"/>
+          <a:stretch/>
+        </p:blipFill>
+        <p:spPr>
+          <a:xfrm>
+            <a:off x="3385266" y="4555067"/>
+            <a:ext cx="5133637" cy="2076933"/>
+          </a:xfrm>
+          <a:prstGeom prst="rect">
+            <a:avLst/>
+          </a:prstGeom>
+        </p:spPr>
+      </p:pic>
+      <p:sp>
+        <p:nvSpPr>
+          <p:cNvPr id="7" name="TextBox 6"/>
+          <p:cNvSpPr txBox="1"/>
+          <p:nvPr/>
+        </p:nvSpPr>
+        <p:spPr>
+          <a:xfrm>
+            <a:off x="4785361" y="4090056"/>
+            <a:ext cx="2186416" cy="646331"/>
+          </a:xfrm>
+          <a:prstGeom prst="rect">
+            <a:avLst/>
+          </a:prstGeom>
+          <a:noFill/>
+        </p:spPr>
+        <p:txBody>
+          <a:bodyPr wrap="none" rtlCol="0">
+            <a:spAutoFit/>
+          </a:bodyPr>
+          <a:lstStyle/>
+          <a:p>
+            <a:r>
+              <a:rPr lang="en-US" sz="3600" dirty="0" smtClean="0"/>
+              <a:t>relaxation</a:t>
+            </a:r>
+            <a:endParaRPr lang="en-US" dirty="0"/>
+          </a:p>
+        </p:txBody>
+      </p:sp>
+      <p:sp>
+        <p:nvSpPr>
+          <p:cNvPr id="8" name="TextBox 7"/>
+          <p:cNvSpPr txBox="1"/>
+          <p:nvPr/>
+        </p:nvSpPr>
+        <p:spPr>
+          <a:xfrm>
+            <a:off x="755612" y="4093402"/>
+            <a:ext cx="1869698" cy="646331"/>
+          </a:xfrm>
+          <a:prstGeom prst="rect">
+            <a:avLst/>
+          </a:prstGeom>
+          <a:noFill/>
+        </p:spPr>
+        <p:txBody>
+          <a:bodyPr wrap="none" rtlCol="0">
+            <a:spAutoFit/>
+          </a:bodyPr>
+          <a:lstStyle/>
+          <a:p>
+            <a:r>
+              <a:rPr lang="en-US" sz="3600" dirty="0" smtClean="0"/>
+              <a:t>stiffness</a:t>
+            </a:r>
+            <a:endParaRPr lang="en-US" dirty="0"/>
+          </a:p>
+        </p:txBody>
+      </p:sp>
+      <p:pic>
+        <p:nvPicPr>
+          <p:cNvPr id="11" name="Content Placeholder 10"/>
           <p:cNvPicPr>
             <a:picLocks noGrp="1" noChangeAspect="1"/>
           </p:cNvPicPr>
@@ -5133,24 +5273,22 @@
             <p:ph idx="1"/>
           </p:nvPr>
         </p:nvPicPr>
-        <p:blipFill>
-          <a:blip r:embed="rId2"/>
-          <a:srcRect t="7440" b="7440"/>
-          <a:stretch>
-            <a:fillRect/>
-          </a:stretch>
+        <p:blipFill rotWithShape="1">
+          <a:blip r:embed="rId4"/>
+          <a:srcRect t="-815" r="379" b="-663"/>
+          <a:stretch/>
         </p:blipFill>
         <p:spPr>
           <a:xfrm>
-            <a:off x="-1" y="1243330"/>
-            <a:ext cx="8981441" cy="3900170"/>
+            <a:off x="0" y="1688746"/>
+            <a:ext cx="9144000" cy="1969110"/>
           </a:xfrm>
         </p:spPr>
       </p:pic>
     </p:spTree>
     <p:extLst>
       <p:ext uri="{BB962C8B-B14F-4D97-AF65-F5344CB8AC3E}">
-        <p14:creationId xmlns:p14="http://schemas.microsoft.com/office/powerpoint/2010/main" val="2954930267"/>
+        <p14:creationId xmlns:p14="http://schemas.microsoft.com/office/powerpoint/2010/main" val="1372215469"/>
       </p:ext>
     </p:extLst>
   </p:cSld>
@@ -5187,22 +5325,22 @@
             <p:ph type="title"/>
           </p:nvPr>
         </p:nvSpPr>
-        <p:spPr/>
-        <p:txBody>
-          <a:bodyPr/>
-          <a:lstStyle/>
-          <a:p>
-            <a:r>
-              <a:rPr lang="en-US" dirty="0" err="1" smtClean="0"/>
-              <a:t>П</a:t>
-            </a:r>
-            <a:r>
-              <a:rPr lang="ru-RU" dirty="0" err="1" smtClean="0"/>
-              <a:t>ример</a:t>
-            </a:r>
+        <p:spPr>
+          <a:xfrm>
+            <a:off x="135116" y="152719"/>
+            <a:ext cx="8728518" cy="819999"/>
+          </a:xfrm>
+        </p:spPr>
+        <p:txBody>
+          <a:bodyPr>
+            <a:normAutofit/>
+          </a:bodyPr>
+          <a:lstStyle/>
+          <a:p>
+            <a:pPr algn="ctr"/>
             <a:r>
               <a:rPr lang="ru-RU" dirty="0" smtClean="0"/>
-              <a:t>: взрыв</a:t>
+              <a:t>импульс</a:t>
             </a:r>
             <a:endParaRPr lang="en-US" dirty="0"/>
           </a:p>
@@ -5210,32 +5348,32 @@
       </p:sp>
       <p:pic>
         <p:nvPicPr>
-          <p:cNvPr id="5" name="Picture 4"/>
+          <p:cNvPr id="4" name="Content Placeholder 3"/>
           <p:cNvPicPr>
-            <a:picLocks noChangeAspect="1"/>
+            <a:picLocks noGrp="1" noChangeAspect="1"/>
           </p:cNvPicPr>
-          <p:nvPr/>
+          <p:nvPr>
+            <p:ph idx="1"/>
+          </p:nvPr>
         </p:nvPicPr>
         <p:blipFill>
           <a:blip r:embed="rId2"/>
+          <a:srcRect t="-7252" b="-7252"/>
           <a:stretch>
             <a:fillRect/>
           </a:stretch>
         </p:blipFill>
         <p:spPr>
           <a:xfrm>
-            <a:off x="457199" y="1310640"/>
-            <a:ext cx="8180719" cy="3596640"/>
-          </a:xfrm>
-          <a:prstGeom prst="rect">
-            <a:avLst/>
-          </a:prstGeom>
+            <a:off x="-1" y="1657773"/>
+            <a:ext cx="8981441" cy="5200227"/>
+          </a:xfrm>
         </p:spPr>
       </p:pic>
     </p:spTree>
     <p:extLst>
       <p:ext uri="{BB962C8B-B14F-4D97-AF65-F5344CB8AC3E}">
-        <p14:creationId xmlns:p14="http://schemas.microsoft.com/office/powerpoint/2010/main" val="343259228"/>
+        <p14:creationId xmlns:p14="http://schemas.microsoft.com/office/powerpoint/2010/main" val="2954930267"/>
       </p:ext>
     </p:extLst>
   </p:cSld>
@@ -5274,16 +5412,15 @@
         </p:nvSpPr>
         <p:spPr>
           <a:xfrm>
-            <a:off x="457200" y="114539"/>
-            <a:ext cx="7620000" cy="1028700"/>
-          </a:xfrm>
-        </p:spPr>
-        <p:txBody>
-          <a:bodyPr>
-            <a:normAutofit fontScale="90000"/>
-          </a:bodyPr>
-          <a:lstStyle/>
-          <a:p>
+            <a:off x="135116" y="152719"/>
+            <a:ext cx="8728518" cy="833509"/>
+          </a:xfrm>
+        </p:spPr>
+        <p:txBody>
+          <a:bodyPr/>
+          <a:lstStyle/>
+          <a:p>
+            <a:pPr algn="ctr"/>
             <a:r>
               <a:rPr lang="en-US" dirty="0" err="1" smtClean="0"/>
               <a:t>П</a:t>
@@ -5296,45 +5433,37 @@
               <a:rPr lang="ru-RU" dirty="0" smtClean="0"/>
               <a:t>: взрыв</a:t>
             </a:r>
-            <a:br>
-              <a:rPr lang="ru-RU" dirty="0" smtClean="0"/>
-            </a:br>
-            <a:r>
-              <a:rPr lang="ru-RU" dirty="0" smtClean="0"/>
-              <a:t>что внутри</a:t>
-            </a:r>
             <a:endParaRPr lang="en-US" dirty="0"/>
           </a:p>
         </p:txBody>
       </p:sp>
       <p:pic>
         <p:nvPicPr>
-          <p:cNvPr id="4" name="Content Placeholder 3"/>
+          <p:cNvPr id="5" name="Picture 4"/>
           <p:cNvPicPr>
-            <a:picLocks noGrp="1" noChangeAspect="1"/>
+            <a:picLocks noChangeAspect="1"/>
           </p:cNvPicPr>
-          <p:nvPr>
-            <p:ph idx="1"/>
-          </p:nvPr>
+          <p:nvPr/>
         </p:nvPicPr>
-        <p:blipFill>
+        <p:blipFill rotWithShape="1">
           <a:blip r:embed="rId2"/>
-          <a:srcRect t="-21483" b="-21483"/>
-          <a:stretch>
-            <a:fillRect/>
-          </a:stretch>
+          <a:srcRect t="-1" r="16895" b="590"/>
+          <a:stretch/>
         </p:blipFill>
         <p:spPr>
           <a:xfrm>
-            <a:off x="650240" y="1578611"/>
-            <a:ext cx="7620000" cy="3280172"/>
-          </a:xfrm>
+            <a:off x="0" y="2004210"/>
+            <a:ext cx="8956413" cy="4710246"/>
+          </a:xfrm>
+          <a:prstGeom prst="rect">
+            <a:avLst/>
+          </a:prstGeom>
         </p:spPr>
       </p:pic>
     </p:spTree>
     <p:extLst>
       <p:ext uri="{BB962C8B-B14F-4D97-AF65-F5344CB8AC3E}">
-        <p14:creationId xmlns:p14="http://schemas.microsoft.com/office/powerpoint/2010/main" val="3612594812"/>
+        <p14:creationId xmlns:p14="http://schemas.microsoft.com/office/powerpoint/2010/main" val="343259228"/>
       </p:ext>
     </p:extLst>
   </p:cSld>
@@ -5371,11 +5500,19 @@
             <p:ph type="title"/>
           </p:nvPr>
         </p:nvSpPr>
-        <p:spPr/>
-        <p:txBody>
-          <a:bodyPr/>
-          <a:lstStyle/>
-          <a:p>
+        <p:spPr>
+          <a:xfrm>
+            <a:off x="94581" y="152719"/>
+            <a:ext cx="8796076" cy="1371600"/>
+          </a:xfrm>
+        </p:spPr>
+        <p:txBody>
+          <a:bodyPr>
+            <a:normAutofit/>
+          </a:bodyPr>
+          <a:lstStyle/>
+          <a:p>
+            <a:pPr algn="ctr"/>
             <a:r>
               <a:rPr lang="en-US" dirty="0" err="1" smtClean="0"/>
               <a:t>П</a:t>
@@ -5386,11 +5523,14 @@
             </a:r>
             <a:r>
               <a:rPr lang="ru-RU" dirty="0" smtClean="0"/>
-              <a:t>: </a:t>
-            </a:r>
-            <a:r>
-              <a:rPr lang="ru-RU" dirty="0" err="1" smtClean="0"/>
-              <a:t>стрелялка</a:t>
+              <a:t>: взрыв</a:t>
+            </a:r>
+            <a:br>
+              <a:rPr lang="ru-RU" dirty="0" smtClean="0"/>
+            </a:br>
+            <a:r>
+              <a:rPr lang="ru-RU" dirty="0" smtClean="0"/>
+              <a:t>что внутри</a:t>
             </a:r>
             <a:endParaRPr lang="en-US" dirty="0"/>
           </a:p>
@@ -5398,7 +5538,7 @@
       </p:sp>
       <p:pic>
         <p:nvPicPr>
-          <p:cNvPr id="4" name="Content Placeholder 3"/>
+          <p:cNvPr id="5" name="Content Placeholder 4"/>
           <p:cNvPicPr>
             <a:picLocks noGrp="1" noChangeAspect="1"/>
           </p:cNvPicPr>
@@ -5406,24 +5546,22 @@
             <p:ph idx="1"/>
           </p:nvPr>
         </p:nvPicPr>
-        <p:blipFill>
+        <p:blipFill rotWithShape="1">
           <a:blip r:embed="rId2"/>
-          <a:srcRect l="2546" r="2546"/>
-          <a:stretch>
-            <a:fillRect/>
-          </a:stretch>
+          <a:srcRect t="889" b="-35"/>
+          <a:stretch/>
         </p:blipFill>
         <p:spPr>
           <a:xfrm>
-            <a:off x="457200" y="1314450"/>
-            <a:ext cx="8157500" cy="3511549"/>
+            <a:off x="0" y="2796565"/>
+            <a:ext cx="9029480" cy="2769544"/>
           </a:xfrm>
         </p:spPr>
       </p:pic>
     </p:spTree>
     <p:extLst>
       <p:ext uri="{BB962C8B-B14F-4D97-AF65-F5344CB8AC3E}">
-        <p14:creationId xmlns:p14="http://schemas.microsoft.com/office/powerpoint/2010/main" val="2147174933"/>
+        <p14:creationId xmlns:p14="http://schemas.microsoft.com/office/powerpoint/2010/main" val="3612594812"/>
       </p:ext>
     </p:extLst>
   </p:cSld>
@@ -5460,27 +5598,32 @@
             <p:ph type="title"/>
           </p:nvPr>
         </p:nvSpPr>
-        <p:spPr/>
-        <p:txBody>
-          <a:bodyPr>
-            <a:normAutofit fontScale="90000"/>
-          </a:bodyPr>
-          <a:lstStyle/>
-          <a:p>
+        <p:spPr>
+          <a:xfrm>
+            <a:off x="108093" y="152719"/>
+            <a:ext cx="8823099" cy="779469"/>
+          </a:xfrm>
+        </p:spPr>
+        <p:txBody>
+          <a:bodyPr/>
+          <a:lstStyle/>
+          <a:p>
+            <a:pPr algn="ctr"/>
             <a:r>
               <a:rPr lang="en-US" dirty="0" err="1" smtClean="0"/>
-              <a:t>С</a:t>
+              <a:t>П</a:t>
+            </a:r>
+            <a:r>
+              <a:rPr lang="ru-RU" dirty="0" err="1" smtClean="0"/>
+              <a:t>ример</a:t>
             </a:r>
             <a:r>
               <a:rPr lang="ru-RU" dirty="0" smtClean="0"/>
-              <a:t>вязи и </a:t>
-            </a:r>
-            <a:br>
-              <a:rPr lang="ru-RU" dirty="0" smtClean="0"/>
-            </a:br>
-            <a:r>
-              <a:rPr lang="ru-RU" dirty="0" smtClean="0"/>
-              <a:t>ограничения</a:t>
+              <a:t>: </a:t>
+            </a:r>
+            <a:r>
+              <a:rPr lang="ru-RU" dirty="0" err="1" smtClean="0"/>
+              <a:t>стрелялка</a:t>
             </a:r>
             <a:endParaRPr lang="en-US" dirty="0"/>
           </a:p>
@@ -5488,78 +5631,32 @@
       </p:sp>
       <p:pic>
         <p:nvPicPr>
-          <p:cNvPr id="9" name="Picture 8"/>
+          <p:cNvPr id="7" name="Content Placeholder 6"/>
           <p:cNvPicPr>
-            <a:picLocks noChangeAspect="1"/>
+            <a:picLocks noGrp="1" noChangeAspect="1"/>
           </p:cNvPicPr>
-          <p:nvPr/>
+          <p:nvPr>
+            <p:ph idx="1"/>
+          </p:nvPr>
         </p:nvPicPr>
         <p:blipFill>
           <a:blip r:embed="rId2"/>
+          <a:srcRect l="12485" r="12485"/>
           <a:stretch>
             <a:fillRect/>
           </a:stretch>
         </p:blipFill>
         <p:spPr>
           <a:xfrm>
-            <a:off x="558800" y="1261111"/>
-            <a:ext cx="2476500" cy="2133600"/>
-          </a:xfrm>
-          <a:prstGeom prst="rect">
-            <a:avLst/>
-          </a:prstGeom>
-        </p:spPr>
-      </p:pic>
-      <p:pic>
-        <p:nvPicPr>
-          <p:cNvPr id="10" name="Picture 9"/>
-          <p:cNvPicPr>
-            <a:picLocks noChangeAspect="1"/>
-          </p:cNvPicPr>
-          <p:nvPr/>
-        </p:nvPicPr>
-        <p:blipFill>
-          <a:blip r:embed="rId3"/>
-          <a:stretch>
-            <a:fillRect/>
-          </a:stretch>
-        </p:blipFill>
-        <p:spPr>
-          <a:xfrm>
-            <a:off x="2062480" y="3533847"/>
-            <a:ext cx="6878320" cy="1609653"/>
-          </a:xfrm>
-          <a:prstGeom prst="rect">
-            <a:avLst/>
-          </a:prstGeom>
-        </p:spPr>
-      </p:pic>
-      <p:pic>
-        <p:nvPicPr>
-          <p:cNvPr id="8" name="Content Placeholder 7"/>
-          <p:cNvPicPr>
-            <a:picLocks noGrp="1" noChangeAspect="1"/>
-          </p:cNvPicPr>
-          <p:nvPr>
-            <p:ph idx="1"/>
-          </p:nvPr>
-        </p:nvPicPr>
-        <p:blipFill rotWithShape="1">
-          <a:blip r:embed="rId4"/>
-          <a:srcRect l="796" r="1721"/>
-          <a:stretch/>
-        </p:blipFill>
-        <p:spPr>
-          <a:xfrm>
-            <a:off x="5191760" y="114539"/>
-            <a:ext cx="3220720" cy="3280172"/>
+            <a:off x="-1" y="1648217"/>
+            <a:ext cx="9076935" cy="5209783"/>
           </a:xfrm>
         </p:spPr>
       </p:pic>
     </p:spTree>
     <p:extLst>
       <p:ext uri="{BB962C8B-B14F-4D97-AF65-F5344CB8AC3E}">
-        <p14:creationId xmlns:p14="http://schemas.microsoft.com/office/powerpoint/2010/main" val="3269312876"/>
+        <p14:creationId xmlns:p14="http://schemas.microsoft.com/office/powerpoint/2010/main" val="2147174933"/>
       </p:ext>
     </p:extLst>
   </p:cSld>
@@ -5596,15 +5693,10 @@
             <p:ph type="title"/>
           </p:nvPr>
         </p:nvSpPr>
-        <p:spPr>
-          <a:xfrm>
-            <a:off x="457200" y="114539"/>
-            <a:ext cx="7620000" cy="1028700"/>
-          </a:xfrm>
-        </p:spPr>
+        <p:spPr/>
         <p:txBody>
           <a:bodyPr>
-            <a:normAutofit fontScale="90000"/>
+            <a:normAutofit/>
           </a:bodyPr>
           <a:lstStyle/>
           <a:p>
@@ -5614,187 +5706,232 @@
             </a:r>
             <a:r>
               <a:rPr lang="ru-RU" dirty="0" smtClean="0"/>
-              <a:t>вязи в</a:t>
-            </a:r>
-            <a:r>
-              <a:rPr lang="en-US" dirty="0" smtClean="0"/>
-              <a:t> </a:t>
+              <a:t>вязи и </a:t>
             </a:r>
             <a:br>
-              <a:rPr lang="en-US" dirty="0" smtClean="0"/>
+              <a:rPr lang="ru-RU" dirty="0" smtClean="0"/>
             </a:br>
             <a:r>
-              <a:rPr lang="en-US" dirty="0" smtClean="0"/>
-              <a:t>p2.js </a:t>
-            </a:r>
-            <a:r>
               <a:rPr lang="ru-RU" dirty="0" smtClean="0"/>
-              <a:t>и</a:t>
-            </a:r>
-            <a:r>
-              <a:rPr lang="en-US" dirty="0" smtClean="0"/>
-              <a:t> </a:t>
-            </a:r>
-            <a:r>
-              <a:rPr lang="en-US" dirty="0" err="1" smtClean="0"/>
-              <a:t>physics.js</a:t>
+              <a:t>ограничения</a:t>
             </a:r>
             <a:endParaRPr lang="en-US" dirty="0"/>
           </a:p>
         </p:txBody>
       </p:sp>
-      <p:sp>
-        <p:nvSpPr>
-          <p:cNvPr id="3" name="Content Placeholder 2"/>
-          <p:cNvSpPr>
-            <a:spLocks noGrp="1"/>
-          </p:cNvSpPr>
+      <p:pic>
+        <p:nvPicPr>
+          <p:cNvPr id="10" name="Picture 9"/>
+          <p:cNvPicPr>
+            <a:picLocks noChangeAspect="1"/>
+          </p:cNvPicPr>
+          <p:nvPr/>
+        </p:nvPicPr>
+        <p:blipFill rotWithShape="1">
+          <a:blip r:embed="rId2"/>
+          <a:srcRect t="-16667" b="-16667"/>
+          <a:stretch/>
+        </p:blipFill>
+        <p:spPr>
+          <a:xfrm>
+            <a:off x="0" y="4900937"/>
+            <a:ext cx="6878320" cy="2146204"/>
+          </a:xfrm>
+          <a:prstGeom prst="rect">
+            <a:avLst/>
+          </a:prstGeom>
+        </p:spPr>
+      </p:pic>
+      <p:pic>
+        <p:nvPicPr>
+          <p:cNvPr id="8" name="Content Placeholder 7"/>
+          <p:cNvPicPr>
+            <a:picLocks noGrp="1" noChangeAspect="1"/>
+          </p:cNvPicPr>
           <p:nvPr>
             <p:ph idx="1"/>
           </p:nvPr>
-        </p:nvSpPr>
-        <p:spPr/>
-        <p:txBody>
-          <a:bodyPr>
-            <a:normAutofit lnSpcReduction="10000"/>
+        </p:nvPicPr>
+        <p:blipFill rotWithShape="1">
+          <a:blip r:embed="rId3"/>
+          <a:srcRect t="-18387" b="-18387"/>
+          <a:stretch/>
+        </p:blipFill>
+        <p:spPr>
+          <a:xfrm>
+            <a:off x="5923280" y="-505301"/>
+            <a:ext cx="3220720" cy="4373563"/>
+          </a:xfrm>
+        </p:spPr>
+      </p:pic>
+      <p:pic>
+        <p:nvPicPr>
+          <p:cNvPr id="3" name="Picture 2"/>
+          <p:cNvPicPr>
+            <a:picLocks noChangeAspect="1"/>
+          </p:cNvPicPr>
+          <p:nvPr/>
+        </p:nvPicPr>
+        <p:blipFill>
+          <a:blip r:embed="rId4"/>
+          <a:stretch>
+            <a:fillRect/>
+          </a:stretch>
+        </p:blipFill>
+        <p:spPr>
+          <a:xfrm>
+            <a:off x="6033501" y="4093522"/>
+            <a:ext cx="2678127" cy="1848048"/>
+          </a:xfrm>
+          <a:prstGeom prst="rect">
+            <a:avLst/>
+          </a:prstGeom>
+        </p:spPr>
+      </p:pic>
+      <p:sp>
+        <p:nvSpPr>
+          <p:cNvPr id="4" name="Rectangle 3"/>
+          <p:cNvSpPr/>
+          <p:nvPr/>
+        </p:nvSpPr>
+        <p:spPr>
+          <a:xfrm>
+            <a:off x="4792387" y="1681482"/>
+            <a:ext cx="1490133" cy="646331"/>
+          </a:xfrm>
+          <a:prstGeom prst="rect">
+            <a:avLst/>
+          </a:prstGeom>
+        </p:spPr>
+        <p:txBody>
+          <a:bodyPr wrap="square">
+            <a:spAutoFit/>
           </a:bodyPr>
           <a:lstStyle/>
           <a:p>
             <a:r>
-              <a:rPr lang="en-US" dirty="0" err="1" smtClean="0"/>
-              <a:t>physics.js</a:t>
-            </a:r>
-            <a:r>
-              <a:rPr lang="en-US" dirty="0" smtClean="0"/>
-              <a:t> – </a:t>
-            </a:r>
-            <a:r>
-              <a:rPr lang="ru-RU" dirty="0" smtClean="0">
-                <a:solidFill>
-                  <a:srgbClr val="9D1E23"/>
-                </a:solidFill>
-              </a:rPr>
-              <a:t>НЕТ!</a:t>
-            </a:r>
-            <a:endParaRPr lang="en-US" dirty="0" smtClean="0">
-              <a:solidFill>
-                <a:srgbClr val="9D1E23"/>
-              </a:solidFill>
-            </a:endParaRPr>
-          </a:p>
-          <a:p>
-            <a:r>
-              <a:rPr lang="en-US" dirty="0" smtClean="0"/>
-              <a:t>p2.js:</a:t>
-            </a:r>
-          </a:p>
-          <a:p>
-            <a:r>
-              <a:rPr lang="en-US" dirty="0"/>
-              <a:t>	</a:t>
-            </a:r>
-            <a:r>
-              <a:rPr lang="en-US" dirty="0" smtClean="0">
-                <a:solidFill>
-                  <a:srgbClr val="9D1E23"/>
-                </a:solidFill>
-              </a:rPr>
-              <a:t>gear</a:t>
-            </a:r>
-            <a:endParaRPr lang="en-US" dirty="0" smtClean="0"/>
-          </a:p>
-          <a:p>
-            <a:r>
-              <a:rPr lang="en-US" dirty="0"/>
-              <a:t>	</a:t>
-            </a:r>
-            <a:r>
-              <a:rPr lang="en-US" dirty="0" smtClean="0">
-                <a:solidFill>
-                  <a:srgbClr val="9D1E23"/>
-                </a:solidFill>
-              </a:rPr>
-              <a:t>lock</a:t>
-            </a:r>
-            <a:endParaRPr lang="en-US" dirty="0" smtClean="0"/>
-          </a:p>
-          <a:p>
-            <a:r>
-              <a:rPr lang="en-US" dirty="0"/>
-              <a:t>	</a:t>
-            </a:r>
-            <a:r>
-              <a:rPr lang="en-US" dirty="0" smtClean="0">
-                <a:solidFill>
-                  <a:srgbClr val="9D1E23"/>
-                </a:solidFill>
-              </a:rPr>
-              <a:t>distance</a:t>
-            </a:r>
-            <a:endParaRPr lang="en-US" dirty="0" smtClean="0"/>
-          </a:p>
-          <a:p>
-            <a:r>
-              <a:rPr lang="en-US"/>
-              <a:t>	</a:t>
-            </a:r>
-            <a:r>
-              <a:rPr lang="en-US" smtClean="0">
-                <a:solidFill>
-                  <a:srgbClr val="9D1E23"/>
-                </a:solidFill>
-              </a:rPr>
-              <a:t>revolution</a:t>
-            </a:r>
-            <a:endParaRPr lang="ru-RU" dirty="0" smtClean="0">
-              <a:solidFill>
-                <a:srgbClr val="9D1E23"/>
-              </a:solidFill>
-            </a:endParaRPr>
-          </a:p>
-          <a:p>
-            <a:r>
-              <a:rPr lang="ru-RU" dirty="0">
-                <a:solidFill>
-                  <a:srgbClr val="9D1E23"/>
-                </a:solidFill>
-              </a:rPr>
-              <a:t>	</a:t>
-            </a:r>
-            <a:r>
-              <a:rPr lang="en-US" dirty="0" smtClean="0">
-                <a:solidFill>
-                  <a:srgbClr val="9D1E23"/>
-                </a:solidFill>
-              </a:rPr>
-              <a:t>prismatic</a:t>
-            </a:r>
-          </a:p>
-          <a:p>
-            <a:r>
-              <a:rPr lang="en-US" dirty="0">
-                <a:solidFill>
-                  <a:srgbClr val="9D1E23"/>
-                </a:solidFill>
-              </a:rPr>
-              <a:t>	</a:t>
-            </a:r>
-            <a:r>
-              <a:rPr lang="en-US" dirty="0" err="1" smtClean="0">
-                <a:solidFill>
-                  <a:srgbClr val="9D1E23"/>
-                </a:solidFill>
-              </a:rPr>
-              <a:t>tearable</a:t>
+              <a:rPr lang="en-US" sz="3600" b="1" dirty="0" smtClean="0"/>
+              <a:t>Lock</a:t>
+            </a:r>
+            <a:endParaRPr lang="en-US" b="1" dirty="0"/>
+          </a:p>
+        </p:txBody>
+      </p:sp>
+      <p:sp>
+        <p:nvSpPr>
+          <p:cNvPr id="5" name="Rectangle 4"/>
+          <p:cNvSpPr/>
+          <p:nvPr/>
+        </p:nvSpPr>
+        <p:spPr>
+          <a:xfrm>
+            <a:off x="6124624" y="3770356"/>
+            <a:ext cx="1236937" cy="646331"/>
+          </a:xfrm>
+          <a:prstGeom prst="rect">
+            <a:avLst/>
+          </a:prstGeom>
+        </p:spPr>
+        <p:txBody>
+          <a:bodyPr wrap="none">
+            <a:spAutoFit/>
+          </a:bodyPr>
+          <a:lstStyle/>
+          <a:p>
+            <a:r>
+              <a:rPr lang="en-US" sz="3600" b="1" dirty="0" smtClean="0"/>
+              <a:t>Gear</a:t>
+            </a:r>
+            <a:endParaRPr lang="en-US" sz="3200" dirty="0"/>
+          </a:p>
+        </p:txBody>
+      </p:sp>
+      <p:sp>
+        <p:nvSpPr>
+          <p:cNvPr id="7" name="Rectangle 6"/>
+          <p:cNvSpPr/>
+          <p:nvPr/>
+        </p:nvSpPr>
+        <p:spPr>
+          <a:xfrm>
+            <a:off x="1284574" y="4608549"/>
+            <a:ext cx="3856945" cy="584776"/>
+          </a:xfrm>
+          <a:prstGeom prst="rect">
+            <a:avLst/>
+          </a:prstGeom>
+        </p:spPr>
+        <p:txBody>
+          <a:bodyPr wrap="none">
+            <a:spAutoFit/>
+          </a:bodyPr>
+          <a:lstStyle/>
+          <a:p>
+            <a:r>
+              <a:rPr lang="en-US" sz="3200" b="1" dirty="0" smtClean="0"/>
+              <a:t>Distance/Prismatic</a:t>
+            </a:r>
+            <a:endParaRPr lang="en-US" sz="3200" dirty="0"/>
+          </a:p>
+        </p:txBody>
+      </p:sp>
+      <p:sp>
+        <p:nvSpPr>
+          <p:cNvPr id="11" name="Rectangle 10"/>
+          <p:cNvSpPr/>
+          <p:nvPr/>
+        </p:nvSpPr>
+        <p:spPr>
+          <a:xfrm>
+            <a:off x="3098472" y="2825525"/>
+            <a:ext cx="2134343" cy="646331"/>
+          </a:xfrm>
+          <a:prstGeom prst="rect">
+            <a:avLst/>
+          </a:prstGeom>
+        </p:spPr>
+        <p:txBody>
+          <a:bodyPr wrap="none">
+            <a:spAutoFit/>
+          </a:bodyPr>
+          <a:lstStyle/>
+          <a:p>
+            <a:r>
+              <a:rPr lang="en-US" sz="3600" b="1" dirty="0" smtClean="0"/>
+              <a:t>Revolute</a:t>
             </a:r>
             <a:endParaRPr lang="en-US" dirty="0"/>
           </a:p>
         </p:txBody>
       </p:sp>
+      <p:pic>
+        <p:nvPicPr>
+          <p:cNvPr id="12" name="Picture 11"/>
+          <p:cNvPicPr>
+            <a:picLocks noChangeAspect="1"/>
+          </p:cNvPicPr>
+          <p:nvPr/>
+        </p:nvPicPr>
+        <p:blipFill>
+          <a:blip r:embed="rId5"/>
+          <a:stretch>
+            <a:fillRect/>
+          </a:stretch>
+        </p:blipFill>
+        <p:spPr>
+          <a:xfrm>
+            <a:off x="0" y="1749821"/>
+            <a:ext cx="3030914" cy="2666866"/>
+          </a:xfrm>
+          <a:prstGeom prst="rect">
+            <a:avLst/>
+          </a:prstGeom>
+        </p:spPr>
+      </p:pic>
     </p:spTree>
     <p:extLst>
       <p:ext uri="{BB962C8B-B14F-4D97-AF65-F5344CB8AC3E}">
-        <p14:creationId xmlns:p14="http://schemas.microsoft.com/office/powerpoint/2010/main" val="357672613"/>
+        <p14:creationId xmlns:p14="http://schemas.microsoft.com/office/powerpoint/2010/main" val="3269312876"/>
       </p:ext>
     </p:extLst>
   </p:cSld>
@@ -5833,60 +5970,156 @@
         </p:nvSpPr>
         <p:spPr>
           <a:xfrm>
-            <a:off x="457200" y="114539"/>
-            <a:ext cx="7620000" cy="1028700"/>
+            <a:off x="-1" y="152719"/>
+            <a:ext cx="8971727" cy="1371600"/>
           </a:xfrm>
         </p:spPr>
         <p:txBody>
           <a:bodyPr>
-            <a:normAutofit fontScale="90000"/>
+            <a:normAutofit/>
           </a:bodyPr>
           <a:lstStyle/>
           <a:p>
+            <a:pPr algn="ctr"/>
+            <a:r>
+              <a:rPr lang="en-US" dirty="0" err="1" smtClean="0"/>
+              <a:t>С</a:t>
+            </a:r>
             <a:r>
               <a:rPr lang="ru-RU" dirty="0" smtClean="0"/>
-              <a:t>пример</a:t>
+              <a:t>вязи в</a:t>
             </a:r>
             <a:r>
               <a:rPr lang="en-US" dirty="0" smtClean="0"/>
-              <a:t>: </a:t>
+              <a:t> </a:t>
+            </a:r>
+            <a:br>
+              <a:rPr lang="en-US" dirty="0" smtClean="0"/>
+            </a:br>
+            <a:r>
+              <a:rPr lang="en-US" dirty="0" smtClean="0"/>
+              <a:t>p2.js </a:t>
             </a:r>
             <a:r>
               <a:rPr lang="ru-RU" dirty="0" smtClean="0"/>
-              <a:t>привязка по расстоянию</a:t>
+              <a:t>и</a:t>
+            </a:r>
+            <a:r>
+              <a:rPr lang="en-US" dirty="0" smtClean="0"/>
+              <a:t> </a:t>
+            </a:r>
+            <a:r>
+              <a:rPr lang="en-US" dirty="0" err="1" smtClean="0"/>
+              <a:t>physics.js</a:t>
             </a:r>
             <a:endParaRPr lang="en-US" dirty="0"/>
           </a:p>
         </p:txBody>
       </p:sp>
-      <p:pic>
-        <p:nvPicPr>
-          <p:cNvPr id="4" name="Content Placeholder 3"/>
-          <p:cNvPicPr>
-            <a:picLocks noGrp="1" noChangeAspect="1"/>
-          </p:cNvPicPr>
+      <p:sp>
+        <p:nvSpPr>
+          <p:cNvPr id="3" name="Content Placeholder 2"/>
+          <p:cNvSpPr>
+            <a:spLocks noGrp="1"/>
+          </p:cNvSpPr>
           <p:nvPr>
             <p:ph idx="1"/>
           </p:nvPr>
-        </p:nvPicPr>
-        <p:blipFill>
-          <a:blip r:embed="rId2"/>
-          <a:srcRect l="4324" r="4324"/>
-          <a:stretch>
-            <a:fillRect/>
-          </a:stretch>
-        </p:blipFill>
-        <p:spPr>
-          <a:xfrm>
-            <a:off x="558800" y="1385570"/>
-            <a:ext cx="7874274" cy="3389629"/>
-          </a:xfrm>
-        </p:spPr>
-      </p:pic>
+        </p:nvSpPr>
+        <p:spPr>
+          <a:xfrm>
+            <a:off x="457199" y="2067026"/>
+            <a:ext cx="8352387" cy="4059138"/>
+          </a:xfrm>
+        </p:spPr>
+        <p:txBody>
+          <a:bodyPr>
+            <a:normAutofit/>
+          </a:bodyPr>
+          <a:lstStyle/>
+          <a:p>
+            <a:r>
+              <a:rPr lang="en-US" sz="3600" dirty="0" err="1" smtClean="0"/>
+              <a:t>physics.js</a:t>
+            </a:r>
+            <a:r>
+              <a:rPr lang="en-US" sz="3600" dirty="0" smtClean="0"/>
+              <a:t> – </a:t>
+            </a:r>
+            <a:r>
+              <a:rPr lang="ru-RU" sz="3600" dirty="0" smtClean="0">
+                <a:solidFill>
+                  <a:srgbClr val="9D1E23"/>
+                </a:solidFill>
+              </a:rPr>
+              <a:t>НЕТ</a:t>
+            </a:r>
+            <a:r>
+              <a:rPr lang="ru-RU" sz="3600" dirty="0" smtClean="0">
+                <a:solidFill>
+                  <a:srgbClr val="9D1E23"/>
+                </a:solidFill>
+              </a:rPr>
+              <a:t>!</a:t>
+            </a:r>
+            <a:endParaRPr lang="en-US" sz="3600" dirty="0" smtClean="0">
+              <a:solidFill>
+                <a:srgbClr val="9D1E23"/>
+              </a:solidFill>
+            </a:endParaRPr>
+          </a:p>
+          <a:p>
+            <a:endParaRPr lang="en-US" sz="3600" dirty="0" smtClean="0">
+              <a:solidFill>
+                <a:srgbClr val="9D1E23"/>
+              </a:solidFill>
+            </a:endParaRPr>
+          </a:p>
+          <a:p>
+            <a:r>
+              <a:rPr lang="en-US" sz="3600" dirty="0" smtClean="0"/>
+              <a:t>p2.</a:t>
+            </a:r>
+            <a:r>
+              <a:rPr lang="en-US" sz="3600" dirty="0" smtClean="0"/>
+              <a:t>js:</a:t>
+            </a:r>
+            <a:r>
+              <a:rPr lang="ru-RU" sz="3600" dirty="0" smtClean="0"/>
+              <a:t> </a:t>
+            </a:r>
+            <a:r>
+              <a:rPr lang="ru-RU" sz="3600" dirty="0" smtClean="0">
+                <a:solidFill>
+                  <a:srgbClr val="9D1E23"/>
+                </a:solidFill>
+              </a:rPr>
+              <a:t>все что были</a:t>
+            </a:r>
+            <a:r>
+              <a:rPr lang="en-US" sz="3600" dirty="0" smtClean="0">
+                <a:solidFill>
+                  <a:srgbClr val="9D1E23"/>
+                </a:solidFill>
+              </a:rPr>
+              <a:t>, </a:t>
+            </a:r>
+            <a:r>
+              <a:rPr lang="ru-RU" sz="3600" dirty="0" smtClean="0">
+                <a:solidFill>
+                  <a:srgbClr val="9D1E23"/>
+                </a:solidFill>
+              </a:rPr>
+              <a:t>разрушаемые</a:t>
+            </a:r>
+            <a:endParaRPr lang="en-US" sz="3600" dirty="0" smtClean="0"/>
+          </a:p>
+        </p:txBody>
+      </p:sp>
     </p:spTree>
     <p:extLst>
       <p:ext uri="{BB962C8B-B14F-4D97-AF65-F5344CB8AC3E}">
-        <p14:creationId xmlns:p14="http://schemas.microsoft.com/office/powerpoint/2010/main" val="1631422585"/>
+        <p14:creationId xmlns:p14="http://schemas.microsoft.com/office/powerpoint/2010/main" val="357672613"/>
       </p:ext>
     </p:extLst>
   </p:cSld>
@@ -5925,19 +6158,28 @@
         </p:nvSpPr>
         <p:spPr>
           <a:xfrm>
-            <a:off x="457200" y="114539"/>
-            <a:ext cx="7620000" cy="1028700"/>
+            <a:off x="0" y="152719"/>
+            <a:ext cx="8985238" cy="1252318"/>
           </a:xfrm>
         </p:spPr>
         <p:txBody>
           <a:bodyPr>
-            <a:normAutofit fontScale="90000"/>
+            <a:normAutofit/>
           </a:bodyPr>
           <a:lstStyle/>
           <a:p>
+            <a:pPr algn="ctr"/>
             <a:r>
               <a:rPr lang="ru-RU" dirty="0" smtClean="0"/>
-              <a:t>Привязка по расстоянию. что внутри</a:t>
+              <a:t>пример</a:t>
+            </a:r>
+            <a:r>
+              <a:rPr lang="en-US" dirty="0" smtClean="0"/>
+              <a:t>: </a:t>
+            </a:r>
+            <a:r>
+              <a:rPr lang="ru-RU" dirty="0" smtClean="0"/>
+              <a:t>привязка по расстоянию</a:t>
             </a:r>
             <a:endParaRPr lang="en-US" dirty="0"/>
           </a:p>
@@ -5945,7 +6187,7 @@
       </p:sp>
       <p:pic>
         <p:nvPicPr>
-          <p:cNvPr id="4" name="Content Placeholder 3"/>
+          <p:cNvPr id="5" name="Content Placeholder 4"/>
           <p:cNvPicPr>
             <a:picLocks noGrp="1" noChangeAspect="1"/>
           </p:cNvPicPr>
@@ -5953,19 +6195,22 @@
             <p:ph idx="1"/>
           </p:nvPr>
         </p:nvPicPr>
-        <p:blipFill>
+        <p:blipFill rotWithShape="1">
           <a:blip r:embed="rId2"/>
-          <a:srcRect t="-65805" b="-65805"/>
-          <a:stretch>
-            <a:fillRect/>
-          </a:stretch>
+          <a:srcRect l="12972" t="-206" r="11845" b="-526"/>
+          <a:stretch/>
         </p:blipFill>
-        <p:spPr/>
+        <p:spPr>
+          <a:xfrm>
+            <a:off x="0" y="1524319"/>
+            <a:ext cx="8985238" cy="5424381"/>
+          </a:xfrm>
+        </p:spPr>
       </p:pic>
     </p:spTree>
     <p:extLst>
       <p:ext uri="{BB962C8B-B14F-4D97-AF65-F5344CB8AC3E}">
-        <p14:creationId xmlns:p14="http://schemas.microsoft.com/office/powerpoint/2010/main" val="1913610087"/>
+        <p14:creationId xmlns:p14="http://schemas.microsoft.com/office/powerpoint/2010/main" val="1631422585"/>
       </p:ext>
     </p:extLst>
   </p:cSld>
@@ -6004,8 +6249,8 @@
         </p:nvSpPr>
         <p:spPr>
           <a:xfrm>
-            <a:off x="457200" y="114539"/>
-            <a:ext cx="7620000" cy="1028700"/>
+            <a:off x="94581" y="152719"/>
+            <a:ext cx="8863633" cy="819999"/>
           </a:xfrm>
         </p:spPr>
         <p:txBody>
@@ -6014,6 +6259,7 @@
           </a:bodyPr>
           <a:lstStyle/>
           <a:p>
+            <a:pPr algn="ctr"/>
             <a:r>
               <a:rPr lang="ru-RU" dirty="0" smtClean="0"/>
               <a:t>Основные компоненты</a:t>
@@ -6034,7 +6280,9 @@
         </p:nvSpPr>
         <p:spPr/>
         <p:txBody>
-          <a:bodyPr/>
+          <a:bodyPr>
+            <a:normAutofit/>
+          </a:bodyPr>
           <a:lstStyle/>
           <a:p>
             <a:pPr marL="342900" indent="-342900">
@@ -6042,10 +6290,10 @@
               <a:buChar char="•"/>
             </a:pPr>
             <a:r>
-              <a:rPr lang="ru-RU" dirty="0" smtClean="0"/>
+              <a:rPr lang="ru-RU" sz="3200" dirty="0" smtClean="0"/>
               <a:t>Мир</a:t>
             </a:r>
-            <a:endParaRPr lang="en-US" dirty="0" smtClean="0"/>
+            <a:endParaRPr lang="en-US" sz="3200" dirty="0" smtClean="0"/>
           </a:p>
           <a:p>
             <a:pPr marL="342900" indent="-342900">
@@ -6053,10 +6301,10 @@
               <a:buChar char="•"/>
             </a:pPr>
             <a:r>
-              <a:rPr lang="ru-RU" dirty="0" smtClean="0"/>
+              <a:rPr lang="ru-RU" sz="3200" dirty="0" smtClean="0"/>
               <a:t>Тела</a:t>
             </a:r>
-            <a:endParaRPr lang="en-US" dirty="0" smtClean="0"/>
+            <a:endParaRPr lang="en-US" sz="3200" dirty="0" smtClean="0"/>
           </a:p>
           <a:p>
             <a:pPr marL="342900" indent="-342900">
@@ -6064,10 +6312,10 @@
               <a:buChar char="•"/>
             </a:pPr>
             <a:r>
-              <a:rPr lang="ru-RU" dirty="0" smtClean="0"/>
+              <a:rPr lang="ru-RU" sz="3200" dirty="0" smtClean="0"/>
               <a:t>Правила взаимодействия</a:t>
             </a:r>
-            <a:endParaRPr lang="en-US" dirty="0" smtClean="0"/>
+            <a:endParaRPr lang="en-US" sz="3200" dirty="0" smtClean="0"/>
           </a:p>
           <a:p>
             <a:pPr marL="342900" indent="-342900">
@@ -6075,10 +6323,25 @@
               <a:buChar char="•"/>
             </a:pPr>
             <a:r>
-              <a:rPr lang="ru-RU" dirty="0" err="1" smtClean="0"/>
+              <a:rPr lang="ru-RU" sz="3200" dirty="0" err="1" smtClean="0"/>
               <a:t>Рендерер</a:t>
             </a:r>
-            <a:endParaRPr lang="en-US" dirty="0"/>
+            <a:endParaRPr lang="ru-RU" sz="3200" dirty="0" smtClean="0"/>
+          </a:p>
+          <a:p>
+            <a:pPr marL="342900" indent="-342900">
+              <a:buFont typeface="Arial"/>
+              <a:buChar char="•"/>
+            </a:pPr>
+            <a:r>
+              <a:rPr lang="en-US" sz="3200" dirty="0"/>
+              <a:t>t</a:t>
+            </a:r>
+            <a:r>
+              <a:rPr lang="en-US" sz="3200" dirty="0" smtClean="0"/>
+              <a:t>ick()</a:t>
+            </a:r>
+            <a:endParaRPr lang="en-US" sz="3200" dirty="0"/>
           </a:p>
         </p:txBody>
       </p:sp>
@@ -6122,14 +6385,22 @@
             <p:ph type="title"/>
           </p:nvPr>
         </p:nvSpPr>
-        <p:spPr/>
-        <p:txBody>
-          <a:bodyPr/>
-          <a:lstStyle/>
-          <a:p>
+        <p:spPr>
+          <a:xfrm>
+            <a:off x="135116" y="152719"/>
+            <a:ext cx="8701494" cy="1371600"/>
+          </a:xfrm>
+        </p:spPr>
+        <p:txBody>
+          <a:bodyPr>
+            <a:normAutofit/>
+          </a:bodyPr>
+          <a:lstStyle/>
+          <a:p>
+            <a:pPr algn="ctr"/>
             <a:r>
               <a:rPr lang="ru-RU" dirty="0" smtClean="0"/>
-              <a:t>Пример: Машинка</a:t>
+              <a:t>Привязка по расстоянию. что внутри</a:t>
             </a:r>
             <a:endParaRPr lang="en-US" dirty="0"/>
           </a:p>
@@ -6137,7 +6408,7 @@
       </p:sp>
       <p:pic>
         <p:nvPicPr>
-          <p:cNvPr id="4" name="Content Placeholder 3"/>
+          <p:cNvPr id="7" name="Content Placeholder 6"/>
           <p:cNvPicPr>
             <a:picLocks noGrp="1" noChangeAspect="1"/>
           </p:cNvPicPr>
@@ -6147,22 +6418,22 @@
         </p:nvPicPr>
         <p:blipFill>
           <a:blip r:embed="rId2"/>
-          <a:srcRect l="9500" r="9500"/>
+          <a:srcRect t="-1802" b="-1802"/>
           <a:stretch>
             <a:fillRect/>
           </a:stretch>
         </p:blipFill>
         <p:spPr>
           <a:xfrm>
-            <a:off x="457200" y="1314450"/>
-            <a:ext cx="8133898" cy="3501389"/>
+            <a:off x="0" y="1752601"/>
+            <a:ext cx="9012262" cy="5172663"/>
           </a:xfrm>
         </p:spPr>
       </p:pic>
     </p:spTree>
     <p:extLst>
       <p:ext uri="{BB962C8B-B14F-4D97-AF65-F5344CB8AC3E}">
-        <p14:creationId xmlns:p14="http://schemas.microsoft.com/office/powerpoint/2010/main" val="3505839621"/>
+        <p14:creationId xmlns:p14="http://schemas.microsoft.com/office/powerpoint/2010/main" val="1913610087"/>
       </p:ext>
     </p:extLst>
   </p:cSld>
@@ -6199,23 +6470,20 @@
             <p:ph type="title"/>
           </p:nvPr>
         </p:nvSpPr>
-        <p:spPr/>
-        <p:txBody>
-          <a:bodyPr>
-            <a:normAutofit fontScale="90000"/>
-          </a:bodyPr>
-          <a:lstStyle/>
-          <a:p>
+        <p:spPr>
+          <a:xfrm>
+            <a:off x="1" y="152719"/>
+            <a:ext cx="8958214" cy="779469"/>
+          </a:xfrm>
+        </p:spPr>
+        <p:txBody>
+          <a:bodyPr/>
+          <a:lstStyle/>
+          <a:p>
+            <a:pPr algn="ctr"/>
             <a:r>
               <a:rPr lang="ru-RU" dirty="0" smtClean="0"/>
-              <a:t>Пример: машинка</a:t>
-            </a:r>
-            <a:br>
-              <a:rPr lang="ru-RU" dirty="0" smtClean="0"/>
-            </a:br>
-            <a:r>
-              <a:rPr lang="ru-RU" dirty="0" smtClean="0"/>
-              <a:t>что внутри</a:t>
+              <a:t>Пример: Машинка</a:t>
             </a:r>
             <a:endParaRPr lang="en-US" dirty="0"/>
           </a:p>
@@ -6231,24 +6499,22 @@
             <p:ph idx="1"/>
           </p:nvPr>
         </p:nvPicPr>
-        <p:blipFill>
+        <p:blipFill rotWithShape="1">
           <a:blip r:embed="rId2"/>
-          <a:srcRect l="-8399" r="-8399"/>
-          <a:stretch>
-            <a:fillRect/>
-          </a:stretch>
+          <a:srcRect l="21622" t="-740" b="2124"/>
+          <a:stretch/>
         </p:blipFill>
         <p:spPr>
           <a:xfrm>
-            <a:off x="-40640" y="1143239"/>
-            <a:ext cx="8554720" cy="3682540"/>
+            <a:off x="1" y="2593914"/>
+            <a:ext cx="9054618" cy="3971933"/>
           </a:xfrm>
         </p:spPr>
       </p:pic>
     </p:spTree>
     <p:extLst>
       <p:ext uri="{BB962C8B-B14F-4D97-AF65-F5344CB8AC3E}">
-        <p14:creationId xmlns:p14="http://schemas.microsoft.com/office/powerpoint/2010/main" val="4159566438"/>
+        <p14:creationId xmlns:p14="http://schemas.microsoft.com/office/powerpoint/2010/main" val="3505839621"/>
       </p:ext>
     </p:extLst>
   </p:cSld>
@@ -6287,27 +6553,27 @@
         </p:nvSpPr>
         <p:spPr>
           <a:xfrm>
-            <a:off x="457200" y="114539"/>
-            <a:ext cx="7620000" cy="1028700"/>
+            <a:off x="0" y="152719"/>
+            <a:ext cx="8998750" cy="1371600"/>
           </a:xfrm>
         </p:spPr>
         <p:txBody>
           <a:bodyPr>
-            <a:normAutofit fontScale="90000"/>
+            <a:normAutofit/>
           </a:bodyPr>
           <a:lstStyle/>
           <a:p>
+            <a:pPr algn="ctr"/>
             <a:r>
               <a:rPr lang="ru-RU" dirty="0" smtClean="0"/>
-              <a:t>Пример: </a:t>
-            </a:r>
-            <a:r>
-              <a:rPr lang="ru-RU" dirty="0" err="1" smtClean="0"/>
-              <a:t>Стрелялка</a:t>
-            </a:r>
-            <a:r>
+              <a:t>Пример: машинка</a:t>
+            </a:r>
+            <a:br>
               <a:rPr lang="ru-RU" dirty="0" smtClean="0"/>
-              <a:t> с разрывом связей</a:t>
+            </a:br>
+            <a:r>
+              <a:rPr lang="ru-RU" dirty="0" smtClean="0"/>
+              <a:t>что внутри</a:t>
             </a:r>
             <a:endParaRPr lang="en-US" dirty="0"/>
           </a:p>
@@ -6315,7 +6581,7 @@
       </p:sp>
       <p:pic>
         <p:nvPicPr>
-          <p:cNvPr id="6" name="Content Placeholder 5"/>
+          <p:cNvPr id="5" name="Content Placeholder 4"/>
           <p:cNvPicPr>
             <a:picLocks noGrp="1" noChangeAspect="1"/>
           </p:cNvPicPr>
@@ -6325,22 +6591,22 @@
         </p:nvPicPr>
         <p:blipFill>
           <a:blip r:embed="rId2"/>
-          <a:srcRect l="2790" r="2790"/>
+          <a:srcRect t="1146" b="1146"/>
           <a:stretch>
             <a:fillRect/>
           </a:stretch>
         </p:blipFill>
         <p:spPr>
           <a:xfrm>
-            <a:off x="457199" y="1314450"/>
-            <a:ext cx="8039489" cy="3460749"/>
+            <a:off x="0" y="1752601"/>
+            <a:ext cx="8998750" cy="5164908"/>
           </a:xfrm>
         </p:spPr>
       </p:pic>
     </p:spTree>
     <p:extLst>
       <p:ext uri="{BB962C8B-B14F-4D97-AF65-F5344CB8AC3E}">
-        <p14:creationId xmlns:p14="http://schemas.microsoft.com/office/powerpoint/2010/main" val="2417207685"/>
+        <p14:creationId xmlns:p14="http://schemas.microsoft.com/office/powerpoint/2010/main" val="4159566438"/>
       </p:ext>
     </p:extLst>
   </p:cSld>
@@ -6379,30 +6645,18 @@
         </p:nvSpPr>
         <p:spPr>
           <a:xfrm>
-            <a:off x="457200" y="114539"/>
-            <a:ext cx="7620000" cy="1028700"/>
-          </a:xfrm>
-        </p:spPr>
-        <p:txBody>
-          <a:bodyPr>
-            <a:normAutofit fontScale="90000"/>
-          </a:bodyPr>
-          <a:lstStyle/>
-          <a:p>
-            <a:r>
-              <a:rPr lang="ru-RU" dirty="0" err="1" smtClean="0"/>
-              <a:t>Стрелялка</a:t>
-            </a:r>
+            <a:off x="121605" y="152719"/>
+            <a:ext cx="8782563" cy="887549"/>
+          </a:xfrm>
+        </p:spPr>
+        <p:txBody>
+          <a:bodyPr/>
+          <a:lstStyle/>
+          <a:p>
+            <a:pPr algn="ctr"/>
             <a:r>
               <a:rPr lang="ru-RU" dirty="0" smtClean="0"/>
-              <a:t> с разрывом.</a:t>
-            </a:r>
-            <a:br>
-              <a:rPr lang="ru-RU" dirty="0" smtClean="0"/>
-            </a:br>
-            <a:r>
-              <a:rPr lang="ru-RU" dirty="0" smtClean="0"/>
-              <a:t>Что внутри</a:t>
+              <a:t>Машинка: что ещё внутри</a:t>
             </a:r>
             <a:endParaRPr lang="en-US" dirty="0"/>
           </a:p>
@@ -6418,30 +6672,152 @@
             <p:ph idx="1"/>
           </p:nvPr>
         </p:nvPicPr>
-        <p:blipFill>
+        <p:blipFill rotWithShape="1">
           <a:blip r:embed="rId2"/>
-          <a:srcRect l="-1354" r="-1354"/>
-          <a:stretch>
-            <a:fillRect/>
-          </a:stretch>
+          <a:srcRect l="19463" t="7512" r="19873" b="24531"/>
+          <a:stretch/>
         </p:blipFill>
         <p:spPr>
           <a:xfrm>
-            <a:off x="457200" y="1314451"/>
-            <a:ext cx="7945120" cy="3420126"/>
+            <a:off x="0" y="2323715"/>
+            <a:ext cx="9007849" cy="4534285"/>
           </a:xfrm>
         </p:spPr>
       </p:pic>
+      <p:cxnSp>
+        <p:nvCxnSpPr>
+          <p:cNvPr id="6" name="Straight Arrow Connector 5"/>
+          <p:cNvCxnSpPr/>
+          <p:nvPr/>
+        </p:nvCxnSpPr>
+        <p:spPr>
+          <a:xfrm flipH="1">
+            <a:off x="1864607" y="4444781"/>
+            <a:ext cx="1824070" cy="959208"/>
+          </a:xfrm>
+          <a:prstGeom prst="straightConnector1">
+            <a:avLst/>
+          </a:prstGeom>
+          <a:ln w="101600" cmpd="sng">
+            <a:solidFill>
+              <a:srgbClr val="FF0000"/>
+            </a:solidFill>
+            <a:tailEnd type="triangle"/>
+          </a:ln>
+        </p:spPr>
+        <p:style>
+          <a:lnRef idx="2">
+            <a:schemeClr val="dk1"/>
+          </a:lnRef>
+          <a:fillRef idx="0">
+            <a:schemeClr val="dk1"/>
+          </a:fillRef>
+          <a:effectRef idx="1">
+            <a:schemeClr val="dk1"/>
+          </a:effectRef>
+          <a:fontRef idx="minor">
+            <a:schemeClr val="tx1"/>
+          </a:fontRef>
+        </p:style>
+      </p:cxnSp>
+      <p:cxnSp>
+        <p:nvCxnSpPr>
+          <p:cNvPr id="7" name="Straight Arrow Connector 6"/>
+          <p:cNvCxnSpPr/>
+          <p:nvPr/>
+        </p:nvCxnSpPr>
+        <p:spPr>
+          <a:xfrm>
+            <a:off x="5350608" y="4444781"/>
+            <a:ext cx="1878118" cy="959208"/>
+          </a:xfrm>
+          <a:prstGeom prst="straightConnector1">
+            <a:avLst/>
+          </a:prstGeom>
+          <a:ln w="101600" cmpd="sng">
+            <a:solidFill>
+              <a:srgbClr val="FF0000"/>
+            </a:solidFill>
+            <a:tailEnd type="triangle"/>
+          </a:ln>
+        </p:spPr>
+        <p:style>
+          <a:lnRef idx="2">
+            <a:schemeClr val="dk1"/>
+          </a:lnRef>
+          <a:fillRef idx="0">
+            <a:schemeClr val="dk1"/>
+          </a:fillRef>
+          <a:effectRef idx="1">
+            <a:schemeClr val="dk1"/>
+          </a:effectRef>
+          <a:fontRef idx="minor">
+            <a:schemeClr val="tx1"/>
+          </a:fontRef>
+        </p:style>
+      </p:cxnSp>
+      <p:sp>
+        <p:nvSpPr>
+          <p:cNvPr id="12" name="TextBox 11"/>
+          <p:cNvSpPr txBox="1"/>
+          <p:nvPr/>
+        </p:nvSpPr>
+        <p:spPr>
+          <a:xfrm>
+            <a:off x="2386023" y="2985704"/>
+            <a:ext cx="4361215" cy="2123658"/>
+          </a:xfrm>
+          <a:prstGeom prst="rect">
+            <a:avLst/>
+          </a:prstGeom>
+          <a:noFill/>
+        </p:spPr>
+        <p:txBody>
+          <a:bodyPr wrap="none" rtlCol="0">
+            <a:spAutoFit/>
+          </a:bodyPr>
+          <a:lstStyle/>
+          <a:p>
+            <a:pPr algn="ctr"/>
+            <a:r>
+              <a:rPr lang="ru-RU" sz="4400" b="1" dirty="0" smtClean="0"/>
+              <a:t>Точки контакта </a:t>
+            </a:r>
+          </a:p>
+          <a:p>
+            <a:pPr algn="ctr"/>
+            <a:r>
+              <a:rPr lang="ru-RU" sz="4400" b="1" dirty="0" smtClean="0"/>
+              <a:t>+ </a:t>
+            </a:r>
+          </a:p>
+          <a:p>
+            <a:pPr algn="ctr"/>
+            <a:r>
+              <a:rPr lang="ru-RU" sz="4400" b="1" dirty="0" smtClean="0"/>
+              <a:t>2 связи</a:t>
+            </a:r>
+            <a:endParaRPr lang="en-US" sz="4400" b="1" dirty="0"/>
+          </a:p>
+        </p:txBody>
+      </p:sp>
     </p:spTree>
     <p:extLst>
       <p:ext uri="{BB962C8B-B14F-4D97-AF65-F5344CB8AC3E}">
-        <p14:creationId xmlns:p14="http://schemas.microsoft.com/office/powerpoint/2010/main" val="1281954993"/>
+        <p14:creationId xmlns:p14="http://schemas.microsoft.com/office/powerpoint/2010/main" val="1316685101"/>
       </p:ext>
     </p:extLst>
   </p:cSld>
   <p:clrMapOvr>
     <a:masterClrMapping/>
   </p:clrMapOvr>
+  <p:timing>
+    <p:tnLst>
+      <p:par>
+        <p:cTn xmlns:p14="http://schemas.microsoft.com/office/powerpoint/2010/main" id="1" dur="indefinite" restart="never" nodeType="tmRoot"/>
+      </p:par>
+    </p:tnLst>
+  </p:timing>
 </p:sld>
 </file>
 
@@ -6474,8 +6850,8 @@
         </p:nvSpPr>
         <p:spPr>
           <a:xfrm>
-            <a:off x="457200" y="114538"/>
-            <a:ext cx="7843520" cy="1561861"/>
+            <a:off x="0" y="152719"/>
+            <a:ext cx="8998750" cy="1371600"/>
           </a:xfrm>
         </p:spPr>
         <p:txBody>
@@ -6486,6 +6862,289 @@
           <a:p>
             <a:pPr algn="ctr"/>
             <a:r>
+              <a:rPr lang="en-US" dirty="0" smtClean="0"/>
+              <a:t>…</a:t>
+            </a:r>
+            <a:r>
+              <a:rPr lang="ru-RU" dirty="0" smtClean="0"/>
+              <a:t>И еще одна машинка. </a:t>
+            </a:r>
+            <a:br>
+              <a:rPr lang="ru-RU" dirty="0" smtClean="0"/>
+            </a:br>
+            <a:r>
+              <a:rPr lang="ru-RU" dirty="0" smtClean="0"/>
+              <a:t>УИИИИ!!!!</a:t>
+            </a:r>
+            <a:endParaRPr lang="en-US" dirty="0"/>
+          </a:p>
+        </p:txBody>
+      </p:sp>
+      <p:pic>
+        <p:nvPicPr>
+          <p:cNvPr id="8" name="Content Placeholder 7"/>
+          <p:cNvPicPr>
+            <a:picLocks noGrp="1" noChangeAspect="1"/>
+          </p:cNvPicPr>
+          <p:nvPr>
+            <p:ph idx="1"/>
+          </p:nvPr>
+        </p:nvPicPr>
+        <p:blipFill>
+          <a:blip r:embed="rId2"/>
+          <a:srcRect t="496" b="496"/>
+          <a:stretch>
+            <a:fillRect/>
+          </a:stretch>
+        </p:blipFill>
+        <p:spPr>
+          <a:xfrm>
+            <a:off x="-1" y="1621197"/>
+            <a:ext cx="9124011" cy="5236803"/>
+          </a:xfrm>
+        </p:spPr>
+      </p:pic>
+    </p:spTree>
+    <p:extLst>
+      <p:ext uri="{BB962C8B-B14F-4D97-AF65-F5344CB8AC3E}">
+        <p14:creationId xmlns:p14="http://schemas.microsoft.com/office/powerpoint/2010/main" val="1852540363"/>
+      </p:ext>
+    </p:extLst>
+  </p:cSld>
+  <p:clrMapOvr>
+    <a:masterClrMapping/>
+  </p:clrMapOvr>
+</p:sld>
+</file>
+
+<file path=ppt/slides/slide35.xml><?xml version="1.0" encoding="utf-8"?>
+<p:sld xmlns:a="http://schemas.openxmlformats.org/drawingml/2006/main" xmlns:r="http://schemas.openxmlformats.org/officeDocument/2006/relationships" xmlns:p="http://schemas.openxmlformats.org/presentationml/2006/main">
+  <p:cSld>
+    <p:spTree>
+      <p:nvGrpSpPr>
+        <p:cNvPr id="1" name=""/>
+        <p:cNvGrpSpPr/>
+        <p:nvPr/>
+      </p:nvGrpSpPr>
+      <p:grpSpPr>
+        <a:xfrm>
+          <a:off x="0" y="0"/>
+          <a:ext cx="0" cy="0"/>
+          <a:chOff x="0" y="0"/>
+          <a:chExt cx="0" cy="0"/>
+        </a:xfrm>
+      </p:grpSpPr>
+      <p:sp>
+        <p:nvSpPr>
+          <p:cNvPr id="2" name="Title 1"/>
+          <p:cNvSpPr>
+            <a:spLocks noGrp="1"/>
+          </p:cNvSpPr>
+          <p:nvPr>
+            <p:ph type="title"/>
+          </p:nvPr>
+        </p:nvSpPr>
+        <p:spPr>
+          <a:xfrm>
+            <a:off x="-1" y="152719"/>
+            <a:ext cx="8944703" cy="1371600"/>
+          </a:xfrm>
+        </p:spPr>
+        <p:txBody>
+          <a:bodyPr>
+            <a:normAutofit/>
+          </a:bodyPr>
+          <a:lstStyle/>
+          <a:p>
+            <a:pPr algn="ctr"/>
+            <a:r>
+              <a:rPr lang="ru-RU" dirty="0" smtClean="0"/>
+              <a:t>Пример: </a:t>
+            </a:r>
+            <a:r>
+              <a:rPr lang="ru-RU" dirty="0" err="1" smtClean="0"/>
+              <a:t>Стрелялка</a:t>
+            </a:r>
+            <a:r>
+              <a:rPr lang="ru-RU" dirty="0" smtClean="0"/>
+              <a:t> с разрывом связей</a:t>
+            </a:r>
+            <a:endParaRPr lang="en-US" dirty="0"/>
+          </a:p>
+        </p:txBody>
+      </p:sp>
+      <p:pic>
+        <p:nvPicPr>
+          <p:cNvPr id="6" name="Content Placeholder 5"/>
+          <p:cNvPicPr>
+            <a:picLocks noGrp="1" noChangeAspect="1"/>
+          </p:cNvPicPr>
+          <p:nvPr>
+            <p:ph idx="1"/>
+          </p:nvPr>
+        </p:nvPicPr>
+        <p:blipFill rotWithShape="1">
+          <a:blip r:embed="rId2"/>
+          <a:srcRect l="12629" t="-241" r="7435" b="-653"/>
+          <a:stretch/>
+        </p:blipFill>
+        <p:spPr>
+          <a:xfrm>
+            <a:off x="0" y="2202126"/>
+            <a:ext cx="9076702" cy="4655874"/>
+          </a:xfrm>
+        </p:spPr>
+      </p:pic>
+    </p:spTree>
+    <p:extLst>
+      <p:ext uri="{BB962C8B-B14F-4D97-AF65-F5344CB8AC3E}">
+        <p14:creationId xmlns:p14="http://schemas.microsoft.com/office/powerpoint/2010/main" val="2417207685"/>
+      </p:ext>
+    </p:extLst>
+  </p:cSld>
+  <p:clrMapOvr>
+    <a:masterClrMapping/>
+  </p:clrMapOvr>
+</p:sld>
+</file>
+
+<file path=ppt/slides/slide36.xml><?xml version="1.0" encoding="utf-8"?>
+<p:sld xmlns:a="http://schemas.openxmlformats.org/drawingml/2006/main" xmlns:r="http://schemas.openxmlformats.org/officeDocument/2006/relationships" xmlns:p="http://schemas.openxmlformats.org/presentationml/2006/main">
+  <p:cSld>
+    <p:spTree>
+      <p:nvGrpSpPr>
+        <p:cNvPr id="1" name=""/>
+        <p:cNvGrpSpPr/>
+        <p:nvPr/>
+      </p:nvGrpSpPr>
+      <p:grpSpPr>
+        <a:xfrm>
+          <a:off x="0" y="0"/>
+          <a:ext cx="0" cy="0"/>
+          <a:chOff x="0" y="0"/>
+          <a:chExt cx="0" cy="0"/>
+        </a:xfrm>
+      </p:grpSpPr>
+      <p:sp>
+        <p:nvSpPr>
+          <p:cNvPr id="2" name="Title 1"/>
+          <p:cNvSpPr>
+            <a:spLocks noGrp="1"/>
+          </p:cNvSpPr>
+          <p:nvPr>
+            <p:ph type="title"/>
+          </p:nvPr>
+        </p:nvSpPr>
+        <p:spPr>
+          <a:xfrm>
+            <a:off x="0" y="152719"/>
+            <a:ext cx="8998750" cy="1265828"/>
+          </a:xfrm>
+        </p:spPr>
+        <p:txBody>
+          <a:bodyPr>
+            <a:normAutofit/>
+          </a:bodyPr>
+          <a:lstStyle/>
+          <a:p>
+            <a:pPr algn="ctr"/>
+            <a:r>
+              <a:rPr lang="ru-RU" dirty="0" err="1" smtClean="0"/>
+              <a:t>Стрелялка</a:t>
+            </a:r>
+            <a:r>
+              <a:rPr lang="ru-RU" dirty="0" smtClean="0"/>
+              <a:t> с разрывом.</a:t>
+            </a:r>
+            <a:br>
+              <a:rPr lang="ru-RU" dirty="0" smtClean="0"/>
+            </a:br>
+            <a:r>
+              <a:rPr lang="ru-RU" dirty="0" smtClean="0"/>
+              <a:t>Что внутри</a:t>
+            </a:r>
+            <a:endParaRPr lang="en-US" dirty="0"/>
+          </a:p>
+        </p:txBody>
+      </p:sp>
+      <p:pic>
+        <p:nvPicPr>
+          <p:cNvPr id="5" name="Content Placeholder 4"/>
+          <p:cNvPicPr>
+            <a:picLocks noGrp="1" noChangeAspect="1"/>
+          </p:cNvPicPr>
+          <p:nvPr>
+            <p:ph idx="1"/>
+          </p:nvPr>
+        </p:nvPicPr>
+        <p:blipFill>
+          <a:blip r:embed="rId2"/>
+          <a:srcRect t="-11468" b="-11468"/>
+          <a:stretch>
+            <a:fillRect/>
+          </a:stretch>
+        </p:blipFill>
+        <p:spPr>
+          <a:xfrm>
+            <a:off x="0" y="1752600"/>
+            <a:ext cx="9139277" cy="5245565"/>
+          </a:xfrm>
+        </p:spPr>
+      </p:pic>
+    </p:spTree>
+    <p:extLst>
+      <p:ext uri="{BB962C8B-B14F-4D97-AF65-F5344CB8AC3E}">
+        <p14:creationId xmlns:p14="http://schemas.microsoft.com/office/powerpoint/2010/main" val="1281954993"/>
+      </p:ext>
+    </p:extLst>
+  </p:cSld>
+  <p:clrMapOvr>
+    <a:masterClrMapping/>
+  </p:clrMapOvr>
+</p:sld>
+</file>
+
+<file path=ppt/slides/slide37.xml><?xml version="1.0" encoding="utf-8"?>
+<p:sld xmlns:a="http://schemas.openxmlformats.org/drawingml/2006/main" xmlns:r="http://schemas.openxmlformats.org/officeDocument/2006/relationships" xmlns:p="http://schemas.openxmlformats.org/presentationml/2006/main">
+  <p:cSld>
+    <p:spTree>
+      <p:nvGrpSpPr>
+        <p:cNvPr id="1" name=""/>
+        <p:cNvGrpSpPr/>
+        <p:nvPr/>
+      </p:nvGrpSpPr>
+      <p:grpSpPr>
+        <a:xfrm>
+          <a:off x="0" y="0"/>
+          <a:ext cx="0" cy="0"/>
+          <a:chOff x="0" y="0"/>
+          <a:chExt cx="0" cy="0"/>
+        </a:xfrm>
+      </p:grpSpPr>
+      <p:sp>
+        <p:nvSpPr>
+          <p:cNvPr id="2" name="Title 1"/>
+          <p:cNvSpPr>
+            <a:spLocks noGrp="1"/>
+          </p:cNvSpPr>
+          <p:nvPr>
+            <p:ph type="title"/>
+          </p:nvPr>
+        </p:nvSpPr>
+        <p:spPr>
+          <a:xfrm>
+            <a:off x="1" y="152718"/>
+            <a:ext cx="8985236" cy="1590069"/>
+          </a:xfrm>
+        </p:spPr>
+        <p:txBody>
+          <a:bodyPr>
+            <a:normAutofit/>
+          </a:bodyPr>
+          <a:lstStyle/>
+          <a:p>
+            <a:pPr algn="ctr"/>
+            <a:r>
               <a:rPr lang="ru-RU" sz="4400" dirty="0" smtClean="0"/>
               <a:t>спасибо</a:t>
             </a:r>
@@ -6520,38 +7179,37 @@
         </p:nvSpPr>
         <p:spPr>
           <a:xfrm>
-            <a:off x="457200" y="1828799"/>
-            <a:ext cx="7965440" cy="2235201"/>
-          </a:xfrm>
-        </p:spPr>
-        <p:txBody>
-          <a:bodyPr/>
-          <a:lstStyle/>
-          <a:p>
-            <a:r>
-              <a:rPr lang="ru-RU" dirty="0" smtClean="0"/>
+            <a:off x="0" y="2438399"/>
+            <a:ext cx="8985237" cy="4276058"/>
+          </a:xfrm>
+        </p:spPr>
+        <p:txBody>
+          <a:bodyPr>
+            <a:normAutofit/>
+          </a:bodyPr>
+          <a:lstStyle/>
+          <a:p>
+            <a:r>
+              <a:rPr lang="ru-RU" sz="3200" dirty="0" smtClean="0"/>
               <a:t>Где я</a:t>
             </a:r>
             <a:r>
-              <a:rPr lang="en-US" dirty="0" smtClean="0"/>
+              <a:rPr lang="en-US" sz="3200" dirty="0" smtClean="0"/>
               <a:t>: </a:t>
             </a:r>
-            <a:endParaRPr lang="en-US" dirty="0" smtClean="0">
-              <a:hlinkClick r:id="rId2"/>
-            </a:endParaRPr>
-          </a:p>
-          <a:p>
-            <a:r>
-              <a:rPr lang="en-US" dirty="0" smtClean="0">
+            <a:endParaRPr lang="en-US" sz="3200" dirty="0"/>
+          </a:p>
+          <a:p>
+            <a:r>
+              <a:rPr lang="en-US" dirty="0">
+                <a:solidFill>
+                  <a:schemeClr val="tx2">
+                    <a:lumMod val="75000"/>
+                  </a:schemeClr>
+                </a:solidFill>
                 <a:hlinkClick r:id="rId2"/>
               </a:rPr>
-              <a:t>www.facebook.com</a:t>
-            </a:r>
-            <a:r>
-              <a:rPr lang="en-US" dirty="0">
-                <a:hlinkClick r:id="rId2"/>
-              </a:rPr>
-              <a:t>/</a:t>
+              <a:t>	</a:t>
             </a:r>
             <a:r>
               <a:rPr lang="en-US" dirty="0" smtClean="0">
@@ -6562,7 +7220,18 @@
                 </a:solidFill>
                 <a:hlinkClick r:id="rId2"/>
               </a:rPr>
-              <a:t>pasha.klimenkov</a:t>
+              <a:t> </a:t>
+            </a:r>
+            <a:r>
+              <a:rPr lang="en-US" sz="4000" dirty="0" smtClean="0">
+                <a:solidFill>
+                  <a:schemeClr val="tx2">
+                    <a:lumMod val="75000"/>
+                  </a:schemeClr>
+                </a:solidFill>
+                <a:hlinkClick r:id="rId2"/>
+              </a:rPr>
+              <a:t>/pasha.klimenkov</a:t>
             </a:r>
             <a:endParaRPr lang="en-US" dirty="0" smtClean="0">
               <a:solidFill>
@@ -6583,17 +7252,21 @@
           </a:p>
           <a:p>
             <a:r>
-              <a:rPr lang="ru-RU" dirty="0" smtClean="0"/>
+              <a:rPr lang="ru-RU" sz="3200" dirty="0" smtClean="0"/>
               <a:t>Где примеры</a:t>
             </a:r>
             <a:r>
-              <a:rPr lang="en-US" dirty="0" smtClean="0"/>
+              <a:rPr lang="en-US" sz="3200" dirty="0" smtClean="0"/>
               <a:t>: </a:t>
             </a:r>
-          </a:p>
-          <a:p>
-            <a:r>
-              <a:rPr lang="en-US" dirty="0" smtClean="0">
+            <a:endParaRPr lang="en-US" sz="3200" dirty="0" smtClean="0"/>
+          </a:p>
+          <a:p>
+            <a:endParaRPr lang="en-US" sz="2800" dirty="0" smtClean="0"/>
+          </a:p>
+          <a:p>
+            <a:r>
+              <a:rPr lang="en-US" sz="3600" dirty="0" smtClean="0">
                 <a:solidFill>
                   <a:schemeClr val="tx2">
                     <a:lumMod val="75000"/>
@@ -6601,10 +7274,10 @@
                 </a:solidFill>
                 <a:hlinkClick r:id="rId3"/>
               </a:rPr>
-              <a:t>github.com</a:t>
-            </a:r>
-            <a:r>
-              <a:rPr lang="en-US" dirty="0">
+              <a:t>	/   /pavel</a:t>
+            </a:r>
+            <a:r>
+              <a:rPr lang="en-US" sz="3600" dirty="0">
                 <a:solidFill>
                   <a:schemeClr val="tx2">
                     <a:lumMod val="75000"/>
@@ -6612,10 +7285,10 @@
                 </a:solidFill>
                 <a:hlinkClick r:id="rId3"/>
               </a:rPr>
-              <a:t>/pavel-klimiankou</a:t>
-            </a:r>
-            <a:r>
-              <a:rPr lang="en-US" dirty="0" smtClean="0">
+              <a:t>-klimiankou</a:t>
+            </a:r>
+            <a:r>
+              <a:rPr lang="en-US" sz="3600" dirty="0" smtClean="0">
                 <a:solidFill>
                   <a:schemeClr val="tx2">
                     <a:lumMod val="75000"/>
@@ -6623,21 +7296,10 @@
                 </a:solidFill>
                 <a:hlinkClick r:id="rId3"/>
               </a:rPr>
-              <a:t>/</a:t>
-            </a:r>
-            <a:r>
-              <a:rPr lang="en-US" dirty="0" smtClean="0">
-                <a:solidFill>
-                  <a:schemeClr val="tx2">
-                    <a:lumMod val="75000"/>
-                  </a:schemeClr>
-                </a:solidFill>
-                <a:hlinkClick r:id="rId3"/>
-              </a:rPr>
-              <a:t>physics</a:t>
-            </a:r>
-            <a:r>
-              <a:rPr lang="ru-RU" dirty="0" smtClean="0">
+              <a:t>/physics</a:t>
+            </a:r>
+            <a:r>
+              <a:rPr lang="ru-RU" sz="3600" dirty="0" smtClean="0">
                 <a:solidFill>
                   <a:schemeClr val="tx2">
                     <a:lumMod val="75000"/>
@@ -6648,7 +7310,7 @@
               <a:t>-</a:t>
             </a:r>
             <a:r>
-              <a:rPr lang="en-US" dirty="0" smtClean="0">
+              <a:rPr lang="en-US" sz="3600" dirty="0" smtClean="0">
                 <a:solidFill>
                   <a:schemeClr val="tx2">
                     <a:lumMod val="75000"/>
@@ -6656,18 +7318,7 @@
                 </a:solidFill>
                 <a:hlinkClick r:id="rId3"/>
               </a:rPr>
-              <a:t>talk</a:t>
-            </a:r>
-            <a:r>
-              <a:rPr lang="en-US" dirty="0" smtClean="0">
-                <a:solidFill>
-                  <a:schemeClr val="tx2">
-                    <a:lumMod val="75000"/>
-                  </a:schemeClr>
-                </a:solidFill>
-                <a:hlinkClick r:id="rId3"/>
-              </a:rPr>
-              <a:t>.git</a:t>
+              <a:t>talk.git</a:t>
             </a:r>
             <a:endParaRPr lang="en-US" dirty="0">
               <a:solidFill>
@@ -6679,6 +7330,54 @@
           </a:p>
         </p:txBody>
       </p:sp>
+      <p:pic>
+        <p:nvPicPr>
+          <p:cNvPr id="4" name="Picture 3"/>
+          <p:cNvPicPr>
+            <a:picLocks noChangeAspect="1"/>
+          </p:cNvPicPr>
+          <p:nvPr/>
+        </p:nvPicPr>
+        <p:blipFill>
+          <a:blip r:embed="rId4"/>
+          <a:stretch>
+            <a:fillRect/>
+          </a:stretch>
+        </p:blipFill>
+        <p:spPr>
+          <a:xfrm>
+            <a:off x="121605" y="3036338"/>
+            <a:ext cx="901838" cy="909053"/>
+          </a:xfrm>
+          <a:prstGeom prst="rect">
+            <a:avLst/>
+          </a:prstGeom>
+        </p:spPr>
+      </p:pic>
+      <p:pic>
+        <p:nvPicPr>
+          <p:cNvPr id="5" name="Picture 4"/>
+          <p:cNvPicPr>
+            <a:picLocks noChangeAspect="1"/>
+          </p:cNvPicPr>
+          <p:nvPr/>
+        </p:nvPicPr>
+        <p:blipFill>
+          <a:blip r:embed="rId5"/>
+          <a:stretch>
+            <a:fillRect/>
+          </a:stretch>
+        </p:blipFill>
+        <p:spPr>
+          <a:xfrm>
+            <a:off x="1" y="5228359"/>
+            <a:ext cx="1474209" cy="1486098"/>
+          </a:xfrm>
+          <a:prstGeom prst="rect">
+            <a:avLst/>
+          </a:prstGeom>
+        </p:spPr>
+      </p:pic>
     </p:spTree>
     <p:extLst>
       <p:ext uri="{BB962C8B-B14F-4D97-AF65-F5344CB8AC3E}">
@@ -6721,8 +7420,8 @@
         </p:nvSpPr>
         <p:spPr>
           <a:xfrm>
-            <a:off x="194818" y="146956"/>
-            <a:ext cx="1935721" cy="1364603"/>
+            <a:off x="0" y="113618"/>
+            <a:ext cx="8998712" cy="664417"/>
           </a:xfrm>
         </p:spPr>
         <p:txBody>
@@ -6734,11 +7433,16 @@
             <a:pPr algn="ctr"/>
             <a:r>
               <a:rPr lang="ru-RU" dirty="0" smtClean="0"/>
-              <a:t>Мир,</a:t>
-            </a:r>
-            <a:br>
+              <a:t>Мир</a:t>
+            </a:r>
+            <a:r>
               <a:rPr lang="ru-RU" dirty="0" smtClean="0"/>
-            </a:br>
+              <a:t>,</a:t>
+            </a:r>
+            <a:r>
+              <a:rPr lang="en-US" dirty="0" smtClean="0"/>
+              <a:t> </a:t>
+            </a:r>
             <a:r>
               <a:rPr lang="ru-RU" dirty="0" smtClean="0"/>
               <a:t>тела</a:t>
@@ -6759,13 +7463,13 @@
         </p:nvPicPr>
         <p:blipFill rotWithShape="1">
           <a:blip r:embed="rId2"/>
-          <a:srcRect l="-171" r="-171"/>
+          <a:srcRect l="342" r="342"/>
           <a:stretch/>
         </p:blipFill>
         <p:spPr>
           <a:xfrm>
-            <a:off x="2466388" y="0"/>
-            <a:ext cx="6549046" cy="5123516"/>
+            <a:off x="1459257" y="898722"/>
+            <a:ext cx="7539455" cy="5959278"/>
           </a:xfrm>
         </p:spPr>
       </p:pic>
@@ -6809,11 +7513,19 @@
             <p:ph type="title"/>
           </p:nvPr>
         </p:nvSpPr>
-        <p:spPr/>
-        <p:txBody>
-          <a:bodyPr/>
-          <a:lstStyle/>
-          <a:p>
+        <p:spPr>
+          <a:xfrm>
+            <a:off x="0" y="162119"/>
+            <a:ext cx="8897475" cy="673191"/>
+          </a:xfrm>
+        </p:spPr>
+        <p:txBody>
+          <a:bodyPr>
+            <a:normAutofit/>
+          </a:bodyPr>
+          <a:lstStyle/>
+          <a:p>
+            <a:pPr algn="ctr"/>
             <a:r>
               <a:rPr lang="ru-RU" dirty="0" err="1" smtClean="0"/>
               <a:t>Рендерер</a:t>
@@ -6834,15 +7546,15 @@
         </p:nvPicPr>
         <p:blipFill>
           <a:blip r:embed="rId2"/>
-          <a:srcRect t="17813" b="17813"/>
+          <a:srcRect l="-8246" r="-8246"/>
           <a:stretch>
             <a:fillRect/>
           </a:stretch>
         </p:blipFill>
         <p:spPr>
           <a:xfrm>
-            <a:off x="152400" y="1920240"/>
-            <a:ext cx="3569279" cy="1536463"/>
+            <a:off x="152401" y="970408"/>
+            <a:ext cx="5511974" cy="3163643"/>
           </a:xfrm>
           <a:prstGeom prst="rect">
             <a:avLst/>
@@ -6886,16 +7598,15 @@
           </p:cNvPicPr>
           <p:nvPr/>
         </p:nvPicPr>
-        <p:blipFill>
+        <p:blipFill rotWithShape="1">
           <a:blip r:embed="rId3"/>
-          <a:stretch>
-            <a:fillRect/>
-          </a:stretch>
+          <a:srcRect t="-1213" b="-1678"/>
+          <a:stretch/>
         </p:blipFill>
         <p:spPr>
           <a:xfrm>
-            <a:off x="5050368" y="1554480"/>
-            <a:ext cx="3347176" cy="2324099"/>
+            <a:off x="3931078" y="3309943"/>
+            <a:ext cx="4966397" cy="3548057"/>
           </a:xfrm>
           <a:prstGeom prst="rect">
             <a:avLst/>
@@ -6940,13 +7651,13 @@
         </p:nvCxnSpPr>
         <p:spPr>
           <a:xfrm>
-            <a:off x="4064000" y="2611120"/>
-            <a:ext cx="731520" cy="0"/>
+            <a:off x="3404932" y="2891134"/>
+            <a:ext cx="1197280" cy="959208"/>
           </a:xfrm>
           <a:prstGeom prst="straightConnector1">
             <a:avLst/>
           </a:prstGeom>
-          <a:ln>
+          <a:ln w="76200" cmpd="sng">
             <a:solidFill>
               <a:srgbClr val="9D1E23"/>
             </a:solidFill>
@@ -7017,16 +7728,17 @@
         </p:nvSpPr>
         <p:spPr>
           <a:xfrm>
-            <a:off x="457200" y="114539"/>
-            <a:ext cx="7620000" cy="1028700"/>
+            <a:off x="457200" y="152719"/>
+            <a:ext cx="7620000" cy="1371600"/>
           </a:xfrm>
         </p:spPr>
         <p:txBody>
           <a:bodyPr>
-            <a:normAutofit fontScale="90000"/>
+            <a:normAutofit/>
           </a:bodyPr>
           <a:lstStyle/>
           <a:p>
+            <a:pPr algn="ctr"/>
             <a:r>
               <a:rPr lang="ru-RU" dirty="0" err="1" smtClean="0"/>
               <a:t>Рендерер</a:t>
@@ -7078,77 +7790,81 @@
               <a:buChar char="•"/>
             </a:pPr>
             <a:r>
-              <a:rPr lang="en-US" dirty="0" smtClean="0"/>
+              <a:rPr lang="en-US" sz="2800" dirty="0" smtClean="0"/>
               <a:t>p2.js – </a:t>
             </a:r>
             <a:r>
-              <a:rPr lang="ru-RU" dirty="0" smtClean="0">
+              <a:rPr lang="ru-RU" sz="2800" dirty="0" smtClean="0">
                 <a:solidFill>
                   <a:srgbClr val="9D1E23"/>
                 </a:solidFill>
               </a:rPr>
               <a:t>нет</a:t>
             </a:r>
+            <a:endParaRPr lang="en-US" sz="2800" dirty="0" smtClean="0">
+              <a:solidFill>
+                <a:srgbClr val="9D1E23"/>
+              </a:solidFill>
+            </a:endParaRPr>
+          </a:p>
+          <a:p>
+            <a:pPr marL="342900" indent="-342900">
+              <a:buFont typeface="Arial"/>
+              <a:buChar char="•"/>
+            </a:pPr>
+            <a:r>
+              <a:rPr lang="en-US" sz="2800" dirty="0" err="1" smtClean="0"/>
+              <a:t>PhysicsJS</a:t>
+            </a:r>
+            <a:r>
+              <a:rPr lang="en-US" sz="2800" dirty="0"/>
+              <a:t> </a:t>
+            </a:r>
+            <a:r>
+              <a:rPr lang="en-US" sz="2800" dirty="0" smtClean="0"/>
+              <a:t>– </a:t>
+            </a:r>
+            <a:r>
+              <a:rPr lang="ru-RU" sz="2800" dirty="0" smtClean="0">
+                <a:solidFill>
+                  <a:srgbClr val="9D1E23"/>
+                </a:solidFill>
+              </a:rPr>
+              <a:t>встроенный, </a:t>
+            </a:r>
+            <a:r>
+              <a:rPr lang="ru-RU" sz="2800" dirty="0" smtClean="0">
+                <a:solidFill>
+                  <a:srgbClr val="9D1E23"/>
+                </a:solidFill>
+              </a:rPr>
+              <a:t>расширяемый</a:t>
+            </a:r>
             <a:endParaRPr lang="en-US" dirty="0" smtClean="0">
               <a:solidFill>
                 <a:srgbClr val="9D1E23"/>
               </a:solidFill>
             </a:endParaRPr>
           </a:p>
-          <a:p>
-            <a:pPr marL="342900" indent="-342900">
-              <a:buFont typeface="Arial"/>
-              <a:buChar char="•"/>
-            </a:pPr>
-            <a:r>
-              <a:rPr lang="en-US" dirty="0" err="1" smtClean="0"/>
-              <a:t>PhysicsJS</a:t>
-            </a:r>
-            <a:r>
-              <a:rPr lang="en-US" dirty="0"/>
-              <a:t> </a:t>
-            </a:r>
-            <a:r>
-              <a:rPr lang="en-US" dirty="0" smtClean="0"/>
-              <a:t>– </a:t>
-            </a:r>
-            <a:r>
-              <a:rPr lang="ru-RU" dirty="0" smtClean="0">
-                <a:solidFill>
-                  <a:srgbClr val="9D1E23"/>
-                </a:solidFill>
-              </a:rPr>
-              <a:t>встроенный, расширяемый</a:t>
-            </a:r>
-            <a:endParaRPr lang="en-US" dirty="0" smtClean="0">
-              <a:solidFill>
-                <a:srgbClr val="9D1E23"/>
-              </a:solidFill>
-            </a:endParaRPr>
-          </a:p>
-          <a:p>
-            <a:endParaRPr lang="en-US" dirty="0"/>
-          </a:p>
         </p:txBody>
       </p:sp>
       <p:pic>
         <p:nvPicPr>
-          <p:cNvPr id="4" name="Picture 3"/>
+          <p:cNvPr id="5" name="Picture 4"/>
           <p:cNvPicPr>
             <a:picLocks noChangeAspect="1"/>
           </p:cNvPicPr>
           <p:nvPr/>
         </p:nvPicPr>
-        <p:blipFill>
+        <p:blipFill rotWithShape="1">
           <a:blip r:embed="rId2"/>
-          <a:stretch>
-            <a:fillRect/>
-          </a:stretch>
+          <a:srcRect l="550" r="550"/>
+          <a:stretch/>
         </p:blipFill>
         <p:spPr>
           <a:xfrm>
-            <a:off x="457200" y="2291080"/>
-            <a:ext cx="7132320" cy="2561608"/>
+            <a:off x="-1" y="3336963"/>
+            <a:ext cx="8970647" cy="3343110"/>
           </a:xfrm>
           <a:prstGeom prst="rect">
             <a:avLst/>
@@ -7195,13 +7911,19 @@
             <p:ph type="title"/>
           </p:nvPr>
         </p:nvSpPr>
-        <p:spPr/>
+        <p:spPr>
+          <a:xfrm>
+            <a:off x="1" y="152718"/>
+            <a:ext cx="8971726" cy="684899"/>
+          </a:xfrm>
+        </p:spPr>
         <p:txBody>
           <a:bodyPr>
             <a:normAutofit/>
           </a:bodyPr>
           <a:lstStyle/>
           <a:p>
+            <a:pPr algn="ctr"/>
             <a:r>
               <a:rPr lang="en-US" dirty="0" smtClean="0"/>
               <a:t>HELLO “WORLD”</a:t>
@@ -7212,7 +7934,7 @@
       </p:sp>
       <p:pic>
         <p:nvPicPr>
-          <p:cNvPr id="4" name="Content Placeholder 3"/>
+          <p:cNvPr id="5" name="Content Placeholder 4"/>
           <p:cNvPicPr>
             <a:picLocks noGrp="1" noChangeAspect="1"/>
           </p:cNvPicPr>
@@ -7220,17 +7942,15 @@
             <p:ph idx="1"/>
           </p:nvPr>
         </p:nvPicPr>
-        <p:blipFill>
+        <p:blipFill rotWithShape="1">
           <a:blip r:embed="rId2"/>
-          <a:srcRect t="1139" b="1139"/>
-          <a:stretch>
-            <a:fillRect/>
-          </a:stretch>
+          <a:srcRect l="952" r="952"/>
+          <a:stretch/>
         </p:blipFill>
         <p:spPr>
           <a:xfrm>
-            <a:off x="457200" y="1314450"/>
-            <a:ext cx="8110296" cy="3491229"/>
+            <a:off x="0" y="2521456"/>
+            <a:ext cx="9072410" cy="3485415"/>
           </a:xfrm>
         </p:spPr>
       </p:pic>
@@ -7274,11 +7994,19 @@
             <p:ph type="title"/>
           </p:nvPr>
         </p:nvSpPr>
-        <p:spPr/>
-        <p:txBody>
-          <a:bodyPr/>
-          <a:lstStyle/>
-          <a:p>
+        <p:spPr>
+          <a:xfrm>
+            <a:off x="0" y="202650"/>
+            <a:ext cx="8985238" cy="896359"/>
+          </a:xfrm>
+        </p:spPr>
+        <p:txBody>
+          <a:bodyPr>
+            <a:normAutofit/>
+          </a:bodyPr>
+          <a:lstStyle/>
+          <a:p>
+            <a:pPr algn="ctr"/>
             <a:r>
               <a:rPr lang="en-US" dirty="0" smtClean="0"/>
               <a:t>HELLO “RENDERER”</a:t>
@@ -7289,7 +8017,7 @@
       </p:sp>
       <p:pic>
         <p:nvPicPr>
-          <p:cNvPr id="4" name="Content Placeholder 3"/>
+          <p:cNvPr id="6" name="Content Placeholder 5"/>
           <p:cNvPicPr>
             <a:picLocks noGrp="1" noChangeAspect="1"/>
           </p:cNvPicPr>
@@ -7297,14 +8025,17 @@
             <p:ph idx="1"/>
           </p:nvPr>
         </p:nvPicPr>
-        <p:blipFill>
+        <p:blipFill rotWithShape="1">
           <a:blip r:embed="rId2"/>
-          <a:srcRect t="-32058" b="-32058"/>
-          <a:stretch>
-            <a:fillRect/>
-          </a:stretch>
+          <a:srcRect t="-1579" b="-1579"/>
+          <a:stretch/>
         </p:blipFill>
-        <p:spPr/>
+        <p:spPr>
+          <a:xfrm>
+            <a:off x="0" y="2904644"/>
+            <a:ext cx="9043194" cy="2701995"/>
+          </a:xfrm>
+        </p:spPr>
       </p:pic>
     </p:spTree>
     <p:extLst>
@@ -7346,13 +8077,19 @@
             <p:ph type="title"/>
           </p:nvPr>
         </p:nvSpPr>
-        <p:spPr/>
+        <p:spPr>
+          <a:xfrm>
+            <a:off x="270233" y="121590"/>
+            <a:ext cx="8458283" cy="889349"/>
+          </a:xfrm>
+        </p:spPr>
         <p:txBody>
           <a:bodyPr>
-            <a:normAutofit fontScale="90000"/>
+            <a:normAutofit/>
           </a:bodyPr>
           <a:lstStyle/>
           <a:p>
+            <a:pPr algn="ctr"/>
             <a:r>
               <a:rPr lang="ru-RU" dirty="0" smtClean="0"/>
               <a:t>Пример</a:t>
@@ -7367,7 +8104,7 @@
       </p:sp>
       <p:pic>
         <p:nvPicPr>
-          <p:cNvPr id="4" name="Content Placeholder 3"/>
+          <p:cNvPr id="5" name="Content Placeholder 4"/>
           <p:cNvPicPr>
             <a:picLocks noGrp="1" noChangeAspect="1"/>
           </p:cNvPicPr>
@@ -7375,17 +8112,15 @@
             <p:ph idx="1"/>
           </p:nvPr>
         </p:nvPicPr>
-        <p:blipFill>
+        <p:blipFill rotWithShape="1">
           <a:blip r:embed="rId2"/>
-          <a:srcRect t="35104" b="35104"/>
-          <a:stretch>
-            <a:fillRect/>
-          </a:stretch>
+          <a:srcRect l="5141" t="32152" b="20398"/>
+          <a:stretch/>
         </p:blipFill>
         <p:spPr>
           <a:xfrm>
-            <a:off x="457200" y="1314450"/>
-            <a:ext cx="7945080" cy="3420109"/>
+            <a:off x="0" y="2472324"/>
+            <a:ext cx="9043742" cy="4385676"/>
           </a:xfrm>
         </p:spPr>
       </p:pic>

</xml_diff>

<commit_message>
Updated presentation. Added one more for Keynote
</commit_message>
<xml_diff>
--- a/GamePhysics.pptx
+++ b/GamePhysics.pptx
@@ -337,7 +337,7 @@
             <a:fld id="{451DEABC-D766-4322-8E78-B830FAE35C72}" type="datetime4">
               <a:rPr lang="en-US" smtClean="0"/>
               <a:pPr/>
-              <a:t>May 19, 2014</a:t>
+              <a:t>May 20, 2014</a:t>
             </a:fld>
             <a:endParaRPr lang="en-US" dirty="0"/>
           </a:p>
@@ -604,7 +604,7 @@
             <a:fld id="{F3131F9E-604E-4343-9F29-EF72E8231CAD}" type="datetime4">
               <a:rPr lang="en-US" smtClean="0"/>
               <a:pPr/>
-              <a:t>May 19, 2014</a:t>
+              <a:t>May 20, 2014</a:t>
             </a:fld>
             <a:endParaRPr lang="en-US"/>
           </a:p>
@@ -781,7 +781,7 @@
             <a:fld id="{34A8E1CE-37F8-4102-8DF9-852A0A51F293}" type="datetime4">
               <a:rPr lang="en-US" smtClean="0"/>
               <a:pPr/>
-              <a:t>May 19, 2014</a:t>
+              <a:t>May 20, 2014</a:t>
             </a:fld>
             <a:endParaRPr lang="en-US"/>
           </a:p>
@@ -948,7 +948,7 @@
             <a:fld id="{93333F43-3E86-47E4-BFBB-2476D384E1C6}" type="datetime4">
               <a:rPr lang="en-US" smtClean="0"/>
               <a:pPr/>
-              <a:t>May 19, 2014</a:t>
+              <a:t>May 20, 2014</a:t>
             </a:fld>
             <a:endParaRPr lang="en-US"/>
           </a:p>
@@ -1199,7 +1199,7 @@
             <a:fld id="{751663BA-01FC-4367-B6F3-ABB2645D55F1}" type="datetime4">
               <a:rPr lang="en-US" smtClean="0"/>
               <a:pPr/>
-              <a:t>May 19, 2014</a:t>
+              <a:t>May 20, 2014</a:t>
             </a:fld>
             <a:endParaRPr lang="en-US" dirty="0"/>
           </a:p>
@@ -1484,7 +1484,7 @@
             <a:fld id="{79B19C71-EC74-44AF-B27E-FC7DC3C3A61D}" type="datetime4">
               <a:rPr lang="en-US" smtClean="0"/>
               <a:pPr/>
-              <a:t>May 19, 2014</a:t>
+              <a:t>May 20, 2014</a:t>
             </a:fld>
             <a:endParaRPr lang="en-US"/>
           </a:p>
@@ -1925,7 +1925,7 @@
             <a:fld id="{6A5CDA29-3CBE-48EA-92AE-A996835462BA}" type="datetime4">
               <a:rPr lang="en-US" smtClean="0"/>
               <a:pPr/>
-              <a:t>May 19, 2014</a:t>
+              <a:t>May 20, 2014</a:t>
             </a:fld>
             <a:endParaRPr lang="en-US"/>
           </a:p>
@@ -2040,7 +2040,7 @@
             <a:fld id="{E29EC054-3869-4501-B163-1BBFDE8DCE04}" type="datetime4">
               <a:rPr lang="en-US" smtClean="0"/>
               <a:pPr/>
-              <a:t>May 19, 2014</a:t>
+              <a:t>May 20, 2014</a:t>
             </a:fld>
             <a:endParaRPr lang="en-US"/>
           </a:p>
@@ -2132,7 +2132,7 @@
             <a:fld id="{0A63D831-56C1-49CF-8EF7-8B9A98402BCD}" type="datetime4">
               <a:rPr lang="en-US" smtClean="0"/>
               <a:pPr/>
-              <a:t>May 19, 2014</a:t>
+              <a:t>May 20, 2014</a:t>
             </a:fld>
             <a:endParaRPr lang="en-US"/>
           </a:p>
@@ -2376,7 +2376,7 @@
             <a:fld id="{6EAD5615-7F4F-4584-84D5-CC95918C321F}" type="datetime4">
               <a:rPr lang="en-US" smtClean="0"/>
               <a:pPr/>
-              <a:t>May 19, 2014</a:t>
+              <a:t>May 20, 2014</a:t>
             </a:fld>
             <a:endParaRPr lang="en-US"/>
           </a:p>
@@ -2672,7 +2672,7 @@
             <a:fld id="{76EEA923-9BEE-48CE-9F28-5B525F399BAD}" type="datetime4">
               <a:rPr lang="en-US" smtClean="0"/>
               <a:pPr/>
-              <a:t>May 19, 2014</a:t>
+              <a:t>May 20, 2014</a:t>
             </a:fld>
             <a:endParaRPr lang="en-US"/>
           </a:p>
@@ -2968,7 +2968,7 @@
             <a:fld id="{17D0EFEE-2756-4A20-BF2A-63F0A94F99AC}" type="datetime4">
               <a:rPr lang="en-US" smtClean="0"/>
               <a:pPr/>
-              <a:t>May 19, 2014</a:t>
+              <a:t>May 20, 2014</a:t>
             </a:fld>
             <a:endParaRPr lang="en-US" dirty="0"/>
           </a:p>
@@ -4831,13 +4831,8 @@
             </a:pPr>
             <a:r>
               <a:rPr lang="ru-RU" sz="2800" dirty="0" smtClean="0"/>
-              <a:t>Силы </a:t>
-            </a:r>
-            <a:r>
-              <a:rPr lang="ru-RU" sz="2800" dirty="0" smtClean="0"/>
-              <a:t>и взаимодействие</a:t>
-            </a:r>
-            <a:endParaRPr lang="ru-RU" sz="2800" dirty="0" smtClean="0"/>
+              <a:t>Силы и взаимодействие</a:t>
+            </a:r>
           </a:p>
           <a:p>
             <a:pPr marL="342900" indent="-342900">
@@ -6052,7 +6047,29 @@
                   <a:srgbClr val="9D1E23"/>
                 </a:solidFill>
               </a:rPr>
-              <a:t>НЕТ</a:t>
+              <a:t>НЕТ!</a:t>
+            </a:r>
+            <a:endParaRPr lang="en-US" sz="3600" dirty="0" smtClean="0">
+              <a:solidFill>
+                <a:srgbClr val="9D1E23"/>
+              </a:solidFill>
+            </a:endParaRPr>
+          </a:p>
+          <a:p>
+            <a:endParaRPr lang="en-US" sz="3600" dirty="0" smtClean="0">
+              <a:solidFill>
+                <a:srgbClr val="9D1E23"/>
+              </a:solidFill>
+            </a:endParaRPr>
+          </a:p>
+          <a:p>
+            <a:r>
+              <a:rPr lang="en-US" sz="3600" dirty="0" smtClean="0"/>
+              <a:t>p2.js:</a:t>
+            </a:r>
+            <a:r>
+              <a:rPr lang="ru-RU" sz="3600" dirty="0" smtClean="0"/>
+              <a:t> </a:t>
             </a:r>
             <a:r>
               <a:rPr lang="ru-RU" sz="3600" dirty="0" smtClean="0">
@@ -6060,33 +6077,15 @@
                   <a:srgbClr val="9D1E23"/>
                 </a:solidFill>
               </a:rPr>
-              <a:t>!</a:t>
-            </a:r>
-            <a:endParaRPr lang="en-US" sz="3600" dirty="0" smtClean="0">
-              <a:solidFill>
-                <a:srgbClr val="9D1E23"/>
-              </a:solidFill>
-            </a:endParaRPr>
-          </a:p>
-          <a:p>
-            <a:endParaRPr lang="en-US" sz="3600" dirty="0" smtClean="0">
-              <a:solidFill>
-                <a:srgbClr val="9D1E23"/>
-              </a:solidFill>
-            </a:endParaRPr>
-          </a:p>
-          <a:p>
-            <a:r>
-              <a:rPr lang="en-US" sz="3600" dirty="0" smtClean="0"/>
-              <a:t>p2.</a:t>
-            </a:r>
-            <a:r>
-              <a:rPr lang="en-US" sz="3600" dirty="0" smtClean="0"/>
-              <a:t>js:</a:t>
-            </a:r>
-            <a:r>
-              <a:rPr lang="ru-RU" sz="3600" dirty="0" smtClean="0"/>
-              <a:t> </a:t>
+              <a:t>все</a:t>
+            </a:r>
+            <a:r>
+              <a:rPr lang="en-US" sz="3600" dirty="0" smtClean="0">
+                <a:solidFill>
+                  <a:srgbClr val="9D1E23"/>
+                </a:solidFill>
+              </a:rPr>
+              <a:t>,</a:t>
             </a:r>
             <a:r>
               <a:rPr lang="ru-RU" sz="3600" dirty="0" smtClean="0">
@@ -6094,7 +6093,31 @@
                   <a:srgbClr val="9D1E23"/>
                 </a:solidFill>
               </a:rPr>
-              <a:t>все что были</a:t>
+              <a:t> </a:t>
+            </a:r>
+            <a:r>
+              <a:rPr lang="ru-RU" sz="3600" dirty="0" smtClean="0">
+                <a:solidFill>
+                  <a:srgbClr val="9D1E23"/>
+                </a:solidFill>
+              </a:rPr>
+              <a:t>что </a:t>
+            </a:r>
+            <a:r>
+              <a:rPr lang="ru-RU" sz="3600" dirty="0" smtClean="0">
+                <a:solidFill>
+                  <a:srgbClr val="9D1E23"/>
+                </a:solidFill>
+              </a:rPr>
+              <a:t>были</a:t>
+            </a:r>
+            <a:r>
+              <a:rPr lang="en-US" sz="3600" dirty="0">
+                <a:solidFill>
+                  <a:srgbClr val="9D1E23"/>
+                </a:solidFill>
+              </a:rPr>
+              <a:t>;</a:t>
             </a:r>
             <a:r>
               <a:rPr lang="en-US" sz="3600" dirty="0" smtClean="0">
@@ -6102,7 +6125,7 @@
                   <a:srgbClr val="9D1E23"/>
                 </a:solidFill>
               </a:rPr>
-              <a:t>, </a:t>
+              <a:t> </a:t>
             </a:r>
             <a:r>
               <a:rPr lang="ru-RU" sz="3600" dirty="0" smtClean="0">
@@ -7259,7 +7282,6 @@
               <a:rPr lang="en-US" sz="3200" dirty="0" smtClean="0"/>
               <a:t>: </a:t>
             </a:r>
-            <a:endParaRPr lang="en-US" sz="3200" dirty="0" smtClean="0"/>
           </a:p>
           <a:p>
             <a:endParaRPr lang="en-US" sz="2800" dirty="0" smtClean="0"/>
@@ -7433,11 +7455,7 @@
             <a:pPr algn="ctr"/>
             <a:r>
               <a:rPr lang="ru-RU" dirty="0" smtClean="0"/>
-              <a:t>Мир</a:t>
-            </a:r>
-            <a:r>
-              <a:rPr lang="ru-RU" dirty="0" smtClean="0"/>
-              <a:t>,</a:t>
+              <a:t>Мир,</a:t>
             </a:r>
             <a:r>
               <a:rPr lang="en-US" dirty="0" smtClean="0"/>
@@ -7830,15 +7848,7 @@
                   <a:srgbClr val="9D1E23"/>
                 </a:solidFill>
               </a:rPr>
-              <a:t>встроенный, </a:t>
-            </a:r>
-            <a:r>
-              <a:rPr lang="ru-RU" sz="2800" dirty="0" smtClean="0">
-                <a:solidFill>
-                  <a:srgbClr val="9D1E23"/>
-                </a:solidFill>
-              </a:rPr>
-              <a:t>расширяемый</a:t>
+              <a:t>встроенный, расширяемый</a:t>
             </a:r>
             <a:endParaRPr lang="en-US" dirty="0" smtClean="0">
               <a:solidFill>

</xml_diff>